<commit_message>
Added slides showing some basic docker commands and how to build an image
</commit_message>
<xml_diff>
--- a/IntroductionToDocker.pptx
+++ b/IntroductionToDocker.pptx
@@ -5,18 +5,20 @@
     <p:sldMasterId id="2147483705" r:id="rId1"/>
   </p:sldMasterIdLst>
   <p:notesMasterIdLst>
-    <p:notesMasterId r:id="rId11"/>
+    <p:notesMasterId r:id="rId13"/>
   </p:notesMasterIdLst>
   <p:sldIdLst>
     <p:sldId id="289" r:id="rId2"/>
     <p:sldId id="290" r:id="rId3"/>
     <p:sldId id="291" r:id="rId4"/>
     <p:sldId id="293" r:id="rId5"/>
-    <p:sldId id="296" r:id="rId6"/>
-    <p:sldId id="292" r:id="rId7"/>
-    <p:sldId id="294" r:id="rId8"/>
-    <p:sldId id="295" r:id="rId9"/>
-    <p:sldId id="297" r:id="rId10"/>
+    <p:sldId id="298" r:id="rId6"/>
+    <p:sldId id="300" r:id="rId7"/>
+    <p:sldId id="296" r:id="rId8"/>
+    <p:sldId id="302" r:id="rId9"/>
+    <p:sldId id="295" r:id="rId10"/>
+    <p:sldId id="297" r:id="rId11"/>
+    <p:sldId id="301" r:id="rId12"/>
   </p:sldIdLst>
   <p:sldSz cx="9144000" cy="6858000" type="screen4x3"/>
   <p:notesSz cx="6858000" cy="9144000"/>
@@ -200,7 +202,7 @@
           <a:p>
             <a:fld id="{7A0E3A32-A577-2D42-A514-7706B5551AD8}" type="datetimeFigureOut">
               <a:rPr lang="en-US" smtClean="0"/>
-              <a:t>03/10/16</a:t>
+              <a:t>10/11/16</a:t>
             </a:fld>
             <a:endParaRPr lang="en-US"/>
           </a:p>
@@ -649,7 +651,7 @@
           <a:p>
             <a:fld id="{21C07646-7B62-4D49-8C57-CBA51FBBFCDD}" type="datetimeFigureOut">
               <a:rPr lang="en-US" smtClean="0"/>
-              <a:t>03/10/16</a:t>
+              <a:t>10/11/16</a:t>
             </a:fld>
             <a:endParaRPr lang="en-US"/>
           </a:p>
@@ -819,7 +821,7 @@
           <a:p>
             <a:fld id="{21C07646-7B62-4D49-8C57-CBA51FBBFCDD}" type="datetimeFigureOut">
               <a:rPr lang="en-US" smtClean="0"/>
-              <a:t>03/10/16</a:t>
+              <a:t>10/11/16</a:t>
             </a:fld>
             <a:endParaRPr lang="en-US"/>
           </a:p>
@@ -999,7 +1001,7 @@
           <a:p>
             <a:fld id="{21C07646-7B62-4D49-8C57-CBA51FBBFCDD}" type="datetimeFigureOut">
               <a:rPr lang="en-US" smtClean="0"/>
-              <a:t>03/10/16</a:t>
+              <a:t>10/11/16</a:t>
             </a:fld>
             <a:endParaRPr lang="en-US"/>
           </a:p>
@@ -1169,7 +1171,7 @@
           <a:p>
             <a:fld id="{21C07646-7B62-4D49-8C57-CBA51FBBFCDD}" type="datetimeFigureOut">
               <a:rPr lang="en-US" smtClean="0"/>
-              <a:t>03/10/16</a:t>
+              <a:t>10/11/16</a:t>
             </a:fld>
             <a:endParaRPr lang="en-US"/>
           </a:p>
@@ -1415,7 +1417,7 @@
           <a:p>
             <a:fld id="{21C07646-7B62-4D49-8C57-CBA51FBBFCDD}" type="datetimeFigureOut">
               <a:rPr lang="en-US" smtClean="0"/>
-              <a:t>03/10/16</a:t>
+              <a:t>10/11/16</a:t>
             </a:fld>
             <a:endParaRPr lang="en-US"/>
           </a:p>
@@ -1703,7 +1705,7 @@
           <a:p>
             <a:fld id="{21C07646-7B62-4D49-8C57-CBA51FBBFCDD}" type="datetimeFigureOut">
               <a:rPr lang="en-US" smtClean="0"/>
-              <a:t>03/10/16</a:t>
+              <a:t>10/11/16</a:t>
             </a:fld>
             <a:endParaRPr lang="en-US"/>
           </a:p>
@@ -2125,7 +2127,7 @@
           <a:p>
             <a:fld id="{21C07646-7B62-4D49-8C57-CBA51FBBFCDD}" type="datetimeFigureOut">
               <a:rPr lang="en-US" smtClean="0"/>
-              <a:t>03/10/16</a:t>
+              <a:t>10/11/16</a:t>
             </a:fld>
             <a:endParaRPr lang="en-US"/>
           </a:p>
@@ -2243,7 +2245,7 @@
           <a:p>
             <a:fld id="{21C07646-7B62-4D49-8C57-CBA51FBBFCDD}" type="datetimeFigureOut">
               <a:rPr lang="en-US" smtClean="0"/>
-              <a:t>03/10/16</a:t>
+              <a:t>10/11/16</a:t>
             </a:fld>
             <a:endParaRPr lang="en-US"/>
           </a:p>
@@ -2338,7 +2340,7 @@
           <a:p>
             <a:fld id="{21C07646-7B62-4D49-8C57-CBA51FBBFCDD}" type="datetimeFigureOut">
               <a:rPr lang="en-US" smtClean="0"/>
-              <a:t>03/10/16</a:t>
+              <a:t>10/11/16</a:t>
             </a:fld>
             <a:endParaRPr lang="en-US"/>
           </a:p>
@@ -2615,7 +2617,7 @@
           <a:p>
             <a:fld id="{21C07646-7B62-4D49-8C57-CBA51FBBFCDD}" type="datetimeFigureOut">
               <a:rPr lang="en-US" smtClean="0"/>
-              <a:t>03/10/16</a:t>
+              <a:t>10/11/16</a:t>
             </a:fld>
             <a:endParaRPr lang="en-US"/>
           </a:p>
@@ -2868,7 +2870,7 @@
           <a:p>
             <a:fld id="{21C07646-7B62-4D49-8C57-CBA51FBBFCDD}" type="datetimeFigureOut">
               <a:rPr lang="en-US" smtClean="0"/>
-              <a:t>03/10/16</a:t>
+              <a:t>10/11/16</a:t>
             </a:fld>
             <a:endParaRPr lang="en-US"/>
           </a:p>
@@ -3081,7 +3083,7 @@
           <a:p>
             <a:fld id="{21C07646-7B62-4D49-8C57-CBA51FBBFCDD}" type="datetimeFigureOut">
               <a:rPr lang="en-US" smtClean="0"/>
-              <a:t>03/10/16</a:t>
+              <a:t>10/11/16</a:t>
             </a:fld>
             <a:endParaRPr lang="en-US"/>
           </a:p>
@@ -3495,10 +3497,22 @@
         </p:nvSpPr>
         <p:spPr/>
         <p:txBody>
-          <a:bodyPr/>
+          <a:bodyPr>
+            <a:normAutofit/>
+          </a:bodyPr>
           <a:lstStyle/>
           <a:p>
-            <a:endParaRPr lang="en-US" dirty="0"/>
+            <a:r>
+              <a:rPr lang="en-US" sz="2400" dirty="0" smtClean="0"/>
+              <a:t>Matt Eldridge</a:t>
+            </a:r>
+          </a:p>
+          <a:p>
+            <a:r>
+              <a:rPr lang="en-US" sz="2400" dirty="0" smtClean="0"/>
+              <a:t>CRUK-CI Bioinformatics Core</a:t>
+            </a:r>
+            <a:endParaRPr lang="en-US" sz="2400" dirty="0"/>
           </a:p>
         </p:txBody>
       </p:sp>
@@ -3506,6 +3520,851 @@
     <p:extLst>
       <p:ext uri="{BB962C8B-B14F-4D97-AF65-F5344CB8AC3E}">
         <p14:creationId xmlns:p14="http://schemas.microsoft.com/office/powerpoint/2010/main" val="1184644927"/>
+      </p:ext>
+    </p:extLst>
+  </p:cSld>
+  <p:clrMapOvr>
+    <a:masterClrMapping/>
+  </p:clrMapOvr>
+  <p:timing>
+    <p:tnLst>
+      <p:par>
+        <p:cTn xmlns:p14="http://schemas.microsoft.com/office/powerpoint/2010/main" id="1" dur="indefinite" restart="never" nodeType="tmRoot"/>
+      </p:par>
+    </p:tnLst>
+  </p:timing>
+</p:sld>
+</file>
+
+<file path=ppt/slides/slide10.xml><?xml version="1.0" encoding="utf-8"?>
+<p:sld xmlns:a="http://schemas.openxmlformats.org/drawingml/2006/main" xmlns:r="http://schemas.openxmlformats.org/officeDocument/2006/relationships" xmlns:p="http://schemas.openxmlformats.org/presentationml/2006/main">
+  <p:cSld>
+    <p:spTree>
+      <p:nvGrpSpPr>
+        <p:cNvPr id="1" name=""/>
+        <p:cNvGrpSpPr/>
+        <p:nvPr/>
+      </p:nvGrpSpPr>
+      <p:grpSpPr>
+        <a:xfrm>
+          <a:off x="0" y="0"/>
+          <a:ext cx="0" cy="0"/>
+          <a:chOff x="0" y="0"/>
+          <a:chExt cx="0" cy="0"/>
+        </a:xfrm>
+      </p:grpSpPr>
+      <p:sp>
+        <p:nvSpPr>
+          <p:cNvPr id="2" name="Title 1"/>
+          <p:cNvSpPr>
+            <a:spLocks noGrp="1"/>
+          </p:cNvSpPr>
+          <p:nvPr>
+            <p:ph type="title"/>
+          </p:nvPr>
+        </p:nvSpPr>
+        <p:spPr/>
+        <p:txBody>
+          <a:bodyPr/>
+          <a:lstStyle/>
+          <a:p>
+            <a:r>
+              <a:rPr lang="en-US" dirty="0" smtClean="0"/>
+              <a:t>So how can </a:t>
+            </a:r>
+            <a:r>
+              <a:rPr lang="en-US" dirty="0" err="1" smtClean="0"/>
+              <a:t>Docker</a:t>
+            </a:r>
+            <a:r>
+              <a:rPr lang="en-US" dirty="0" smtClean="0"/>
+              <a:t> help me?</a:t>
+            </a:r>
+            <a:endParaRPr lang="en-US" dirty="0"/>
+          </a:p>
+        </p:txBody>
+      </p:sp>
+      <p:sp>
+        <p:nvSpPr>
+          <p:cNvPr id="3" name="Content Placeholder 2"/>
+          <p:cNvSpPr>
+            <a:spLocks noGrp="1"/>
+          </p:cNvSpPr>
+          <p:nvPr>
+            <p:ph idx="1"/>
+          </p:nvPr>
+        </p:nvSpPr>
+        <p:spPr/>
+        <p:txBody>
+          <a:bodyPr>
+            <a:normAutofit/>
+          </a:bodyPr>
+          <a:lstStyle/>
+          <a:p>
+            <a:r>
+              <a:rPr lang="en-US" sz="2400" dirty="0" smtClean="0"/>
+              <a:t>Trialing </a:t>
+            </a:r>
+            <a:r>
+              <a:rPr lang="en-US" sz="2400" dirty="0" smtClean="0"/>
+              <a:t>new software</a:t>
+            </a:r>
+          </a:p>
+          <a:p>
+            <a:pPr lvl="1"/>
+            <a:r>
+              <a:rPr lang="en-US" sz="2000" dirty="0"/>
+              <a:t>Clean, unpolluted starting point</a:t>
+            </a:r>
+          </a:p>
+          <a:p>
+            <a:pPr lvl="1"/>
+            <a:r>
+              <a:rPr lang="en-US" sz="2000" dirty="0" smtClean="0"/>
+              <a:t>Isolated </a:t>
+            </a:r>
+            <a:r>
+              <a:rPr lang="en-US" sz="2000" dirty="0" smtClean="0"/>
+              <a:t>environment, won’t </a:t>
+            </a:r>
+            <a:r>
+              <a:rPr lang="en-US" sz="2000" dirty="0" smtClean="0"/>
+              <a:t>affect other applications</a:t>
+            </a:r>
+          </a:p>
+          <a:p>
+            <a:pPr lvl="1"/>
+            <a:r>
+              <a:rPr lang="en-US" sz="2000" dirty="0" err="1" smtClean="0"/>
+              <a:t>Superuser</a:t>
+            </a:r>
+            <a:r>
+              <a:rPr lang="en-US" sz="2000" dirty="0" smtClean="0"/>
+              <a:t> privileges and complete control over what you install</a:t>
+            </a:r>
+          </a:p>
+          <a:p>
+            <a:endParaRPr lang="en-US" sz="2400" dirty="0" smtClean="0"/>
+          </a:p>
+          <a:p>
+            <a:r>
+              <a:rPr lang="en-US" sz="2400" dirty="0" smtClean="0"/>
+              <a:t>Bioinformatics developers increasingly using </a:t>
+            </a:r>
+            <a:r>
+              <a:rPr lang="en-US" sz="2400" dirty="0" err="1" smtClean="0"/>
+              <a:t>docker</a:t>
+            </a:r>
+            <a:r>
+              <a:rPr lang="en-US" sz="2400" dirty="0" smtClean="0"/>
+              <a:t> to package and distribute applications</a:t>
+            </a:r>
+          </a:p>
+          <a:p>
+            <a:endParaRPr lang="en-US" sz="2400" dirty="0" smtClean="0"/>
+          </a:p>
+          <a:p>
+            <a:r>
+              <a:rPr lang="en-US" sz="2400" dirty="0" smtClean="0"/>
+              <a:t>Deployment of an application during development</a:t>
+            </a:r>
+          </a:p>
+          <a:p>
+            <a:pPr lvl="1"/>
+            <a:r>
+              <a:rPr lang="en-US" sz="2000" dirty="0" smtClean="0"/>
+              <a:t>Share your environment with a colleague to run on their machine</a:t>
+            </a:r>
+          </a:p>
+          <a:p>
+            <a:pPr lvl="1"/>
+            <a:r>
+              <a:rPr lang="en-US" sz="2000" dirty="0" smtClean="0"/>
+              <a:t>Update a production system with minimum downtime</a:t>
+            </a:r>
+            <a:endParaRPr lang="en-US" sz="2000" dirty="0"/>
+          </a:p>
+        </p:txBody>
+      </p:sp>
+    </p:spTree>
+    <p:extLst>
+      <p:ext uri="{BB962C8B-B14F-4D97-AF65-F5344CB8AC3E}">
+        <p14:creationId xmlns:p14="http://schemas.microsoft.com/office/powerpoint/2010/main" val="1058359892"/>
+      </p:ext>
+    </p:extLst>
+  </p:cSld>
+  <p:clrMapOvr>
+    <a:masterClrMapping/>
+  </p:clrMapOvr>
+  <p:timing>
+    <p:tnLst>
+      <p:par>
+        <p:cTn xmlns:p14="http://schemas.microsoft.com/office/powerpoint/2010/main" id="1" dur="indefinite" restart="never" nodeType="tmRoot">
+          <p:childTnLst>
+            <p:seq concurrent="1" nextAc="seek">
+              <p:cTn id="2" dur="indefinite" nodeType="mainSeq">
+                <p:childTnLst>
+                  <p:par>
+                    <p:cTn id="3" fill="hold">
+                      <p:stCondLst>
+                        <p:cond delay="indefinite"/>
+                      </p:stCondLst>
+                      <p:childTnLst>
+                        <p:par>
+                          <p:cTn id="4" fill="hold">
+                            <p:stCondLst>
+                              <p:cond delay="0"/>
+                            </p:stCondLst>
+                            <p:childTnLst>
+                              <p:par>
+                                <p:cTn id="5" presetID="1" presetClass="entr" presetSubtype="0" fill="hold" grpId="0" nodeType="clickEffect">
+                                  <p:stCondLst>
+                                    <p:cond delay="0"/>
+                                  </p:stCondLst>
+                                  <p:childTnLst>
+                                    <p:set>
+                                      <p:cBhvr>
+                                        <p:cTn id="6" dur="1" fill="hold">
+                                          <p:stCondLst>
+                                            <p:cond delay="0"/>
+                                          </p:stCondLst>
+                                        </p:cTn>
+                                        <p:tgtEl>
+                                          <p:spTgt spid="3">
+                                            <p:txEl>
+                                              <p:pRg st="0" end="0"/>
+                                            </p:txEl>
+                                          </p:spTgt>
+                                        </p:tgtEl>
+                                        <p:attrNameLst>
+                                          <p:attrName>style.visibility</p:attrName>
+                                        </p:attrNameLst>
+                                      </p:cBhvr>
+                                      <p:to>
+                                        <p:strVal val="visible"/>
+                                      </p:to>
+                                    </p:set>
+                                  </p:childTnLst>
+                                </p:cTn>
+                              </p:par>
+                              <p:par>
+                                <p:cTn id="7" presetID="1" presetClass="entr" presetSubtype="0" fill="hold" grpId="0" nodeType="withEffect">
+                                  <p:stCondLst>
+                                    <p:cond delay="0"/>
+                                  </p:stCondLst>
+                                  <p:childTnLst>
+                                    <p:set>
+                                      <p:cBhvr>
+                                        <p:cTn id="8" dur="1" fill="hold">
+                                          <p:stCondLst>
+                                            <p:cond delay="0"/>
+                                          </p:stCondLst>
+                                        </p:cTn>
+                                        <p:tgtEl>
+                                          <p:spTgt spid="3">
+                                            <p:txEl>
+                                              <p:pRg st="1" end="1"/>
+                                            </p:txEl>
+                                          </p:spTgt>
+                                        </p:tgtEl>
+                                        <p:attrNameLst>
+                                          <p:attrName>style.visibility</p:attrName>
+                                        </p:attrNameLst>
+                                      </p:cBhvr>
+                                      <p:to>
+                                        <p:strVal val="visible"/>
+                                      </p:to>
+                                    </p:set>
+                                  </p:childTnLst>
+                                </p:cTn>
+                              </p:par>
+                              <p:par>
+                                <p:cTn id="9" presetID="1" presetClass="entr" presetSubtype="0" fill="hold" grpId="0" nodeType="withEffect">
+                                  <p:stCondLst>
+                                    <p:cond delay="0"/>
+                                  </p:stCondLst>
+                                  <p:childTnLst>
+                                    <p:set>
+                                      <p:cBhvr>
+                                        <p:cTn id="10" dur="1" fill="hold">
+                                          <p:stCondLst>
+                                            <p:cond delay="0"/>
+                                          </p:stCondLst>
+                                        </p:cTn>
+                                        <p:tgtEl>
+                                          <p:spTgt spid="3">
+                                            <p:txEl>
+                                              <p:pRg st="2" end="2"/>
+                                            </p:txEl>
+                                          </p:spTgt>
+                                        </p:tgtEl>
+                                        <p:attrNameLst>
+                                          <p:attrName>style.visibility</p:attrName>
+                                        </p:attrNameLst>
+                                      </p:cBhvr>
+                                      <p:to>
+                                        <p:strVal val="visible"/>
+                                      </p:to>
+                                    </p:set>
+                                  </p:childTnLst>
+                                </p:cTn>
+                              </p:par>
+                              <p:par>
+                                <p:cTn id="11" presetID="1" presetClass="entr" presetSubtype="0" fill="hold" grpId="0" nodeType="withEffect">
+                                  <p:stCondLst>
+                                    <p:cond delay="0"/>
+                                  </p:stCondLst>
+                                  <p:childTnLst>
+                                    <p:set>
+                                      <p:cBhvr>
+                                        <p:cTn id="12" dur="1" fill="hold">
+                                          <p:stCondLst>
+                                            <p:cond delay="0"/>
+                                          </p:stCondLst>
+                                        </p:cTn>
+                                        <p:tgtEl>
+                                          <p:spTgt spid="3">
+                                            <p:txEl>
+                                              <p:pRg st="3" end="3"/>
+                                            </p:txEl>
+                                          </p:spTgt>
+                                        </p:tgtEl>
+                                        <p:attrNameLst>
+                                          <p:attrName>style.visibility</p:attrName>
+                                        </p:attrNameLst>
+                                      </p:cBhvr>
+                                      <p:to>
+                                        <p:strVal val="visible"/>
+                                      </p:to>
+                                    </p:set>
+                                  </p:childTnLst>
+                                </p:cTn>
+                              </p:par>
+                            </p:childTnLst>
+                          </p:cTn>
+                        </p:par>
+                      </p:childTnLst>
+                    </p:cTn>
+                  </p:par>
+                  <p:par>
+                    <p:cTn id="13" fill="hold">
+                      <p:stCondLst>
+                        <p:cond delay="indefinite"/>
+                      </p:stCondLst>
+                      <p:childTnLst>
+                        <p:par>
+                          <p:cTn id="14" fill="hold">
+                            <p:stCondLst>
+                              <p:cond delay="0"/>
+                            </p:stCondLst>
+                            <p:childTnLst>
+                              <p:par>
+                                <p:cTn id="15" presetID="1" presetClass="entr" presetSubtype="0" fill="hold" grpId="0" nodeType="clickEffect">
+                                  <p:stCondLst>
+                                    <p:cond delay="0"/>
+                                  </p:stCondLst>
+                                  <p:childTnLst>
+                                    <p:set>
+                                      <p:cBhvr>
+                                        <p:cTn id="16" dur="1" fill="hold">
+                                          <p:stCondLst>
+                                            <p:cond delay="0"/>
+                                          </p:stCondLst>
+                                        </p:cTn>
+                                        <p:tgtEl>
+                                          <p:spTgt spid="3">
+                                            <p:txEl>
+                                              <p:pRg st="5" end="5"/>
+                                            </p:txEl>
+                                          </p:spTgt>
+                                        </p:tgtEl>
+                                        <p:attrNameLst>
+                                          <p:attrName>style.visibility</p:attrName>
+                                        </p:attrNameLst>
+                                      </p:cBhvr>
+                                      <p:to>
+                                        <p:strVal val="visible"/>
+                                      </p:to>
+                                    </p:set>
+                                  </p:childTnLst>
+                                </p:cTn>
+                              </p:par>
+                            </p:childTnLst>
+                          </p:cTn>
+                        </p:par>
+                      </p:childTnLst>
+                    </p:cTn>
+                  </p:par>
+                  <p:par>
+                    <p:cTn id="17" fill="hold">
+                      <p:stCondLst>
+                        <p:cond delay="indefinite"/>
+                      </p:stCondLst>
+                      <p:childTnLst>
+                        <p:par>
+                          <p:cTn id="18" fill="hold">
+                            <p:stCondLst>
+                              <p:cond delay="0"/>
+                            </p:stCondLst>
+                            <p:childTnLst>
+                              <p:par>
+                                <p:cTn id="19" presetID="1" presetClass="entr" presetSubtype="0" fill="hold" grpId="0" nodeType="clickEffect">
+                                  <p:stCondLst>
+                                    <p:cond delay="0"/>
+                                  </p:stCondLst>
+                                  <p:childTnLst>
+                                    <p:set>
+                                      <p:cBhvr>
+                                        <p:cTn id="20" dur="1" fill="hold">
+                                          <p:stCondLst>
+                                            <p:cond delay="0"/>
+                                          </p:stCondLst>
+                                        </p:cTn>
+                                        <p:tgtEl>
+                                          <p:spTgt spid="3">
+                                            <p:txEl>
+                                              <p:pRg st="7" end="7"/>
+                                            </p:txEl>
+                                          </p:spTgt>
+                                        </p:tgtEl>
+                                        <p:attrNameLst>
+                                          <p:attrName>style.visibility</p:attrName>
+                                        </p:attrNameLst>
+                                      </p:cBhvr>
+                                      <p:to>
+                                        <p:strVal val="visible"/>
+                                      </p:to>
+                                    </p:set>
+                                  </p:childTnLst>
+                                </p:cTn>
+                              </p:par>
+                              <p:par>
+                                <p:cTn id="21" presetID="1" presetClass="entr" presetSubtype="0" fill="hold" grpId="0" nodeType="withEffect">
+                                  <p:stCondLst>
+                                    <p:cond delay="0"/>
+                                  </p:stCondLst>
+                                  <p:childTnLst>
+                                    <p:set>
+                                      <p:cBhvr>
+                                        <p:cTn id="22" dur="1" fill="hold">
+                                          <p:stCondLst>
+                                            <p:cond delay="0"/>
+                                          </p:stCondLst>
+                                        </p:cTn>
+                                        <p:tgtEl>
+                                          <p:spTgt spid="3">
+                                            <p:txEl>
+                                              <p:pRg st="8" end="8"/>
+                                            </p:txEl>
+                                          </p:spTgt>
+                                        </p:tgtEl>
+                                        <p:attrNameLst>
+                                          <p:attrName>style.visibility</p:attrName>
+                                        </p:attrNameLst>
+                                      </p:cBhvr>
+                                      <p:to>
+                                        <p:strVal val="visible"/>
+                                      </p:to>
+                                    </p:set>
+                                  </p:childTnLst>
+                                </p:cTn>
+                              </p:par>
+                              <p:par>
+                                <p:cTn id="23" presetID="1" presetClass="entr" presetSubtype="0" fill="hold" grpId="0" nodeType="withEffect">
+                                  <p:stCondLst>
+                                    <p:cond delay="0"/>
+                                  </p:stCondLst>
+                                  <p:childTnLst>
+                                    <p:set>
+                                      <p:cBhvr>
+                                        <p:cTn id="24" dur="1" fill="hold">
+                                          <p:stCondLst>
+                                            <p:cond delay="0"/>
+                                          </p:stCondLst>
+                                        </p:cTn>
+                                        <p:tgtEl>
+                                          <p:spTgt spid="3">
+                                            <p:txEl>
+                                              <p:pRg st="9" end="9"/>
+                                            </p:txEl>
+                                          </p:spTgt>
+                                        </p:tgtEl>
+                                        <p:attrNameLst>
+                                          <p:attrName>style.visibility</p:attrName>
+                                        </p:attrNameLst>
+                                      </p:cBhvr>
+                                      <p:to>
+                                        <p:strVal val="visible"/>
+                                      </p:to>
+                                    </p:set>
+                                  </p:childTnLst>
+                                </p:cTn>
+                              </p:par>
+                            </p:childTnLst>
+                          </p:cTn>
+                        </p:par>
+                      </p:childTnLst>
+                    </p:cTn>
+                  </p:par>
+                </p:childTnLst>
+              </p:cTn>
+              <p:prevCondLst>
+                <p:cond evt="onPrev" delay="0">
+                  <p:tgtEl>
+                    <p:sldTgt/>
+                  </p:tgtEl>
+                </p:cond>
+              </p:prevCondLst>
+              <p:nextCondLst>
+                <p:cond evt="onNext" delay="0">
+                  <p:tgtEl>
+                    <p:sldTgt/>
+                  </p:tgtEl>
+                </p:cond>
+              </p:nextCondLst>
+            </p:seq>
+          </p:childTnLst>
+        </p:cTn>
+      </p:par>
+    </p:tnLst>
+    <p:bldLst>
+      <p:bldP spid="3" grpId="0" build="p"/>
+    </p:bldLst>
+  </p:timing>
+</p:sld>
+</file>
+
+<file path=ppt/slides/slide11.xml><?xml version="1.0" encoding="utf-8"?>
+<p:sld xmlns:a="http://schemas.openxmlformats.org/drawingml/2006/main" xmlns:r="http://schemas.openxmlformats.org/officeDocument/2006/relationships" xmlns:p="http://schemas.openxmlformats.org/presentationml/2006/main">
+  <p:cSld>
+    <p:spTree>
+      <p:nvGrpSpPr>
+        <p:cNvPr id="1" name=""/>
+        <p:cNvGrpSpPr/>
+        <p:nvPr/>
+      </p:nvGrpSpPr>
+      <p:grpSpPr>
+        <a:xfrm>
+          <a:off x="0" y="0"/>
+          <a:ext cx="0" cy="0"/>
+          <a:chOff x="0" y="0"/>
+          <a:chExt cx="0" cy="0"/>
+        </a:xfrm>
+      </p:grpSpPr>
+      <p:sp>
+        <p:nvSpPr>
+          <p:cNvPr id="2" name="Title 1"/>
+          <p:cNvSpPr>
+            <a:spLocks noGrp="1"/>
+          </p:cNvSpPr>
+          <p:nvPr>
+            <p:ph type="title"/>
+          </p:nvPr>
+        </p:nvSpPr>
+        <p:spPr/>
+        <p:txBody>
+          <a:bodyPr/>
+          <a:lstStyle/>
+          <a:p>
+            <a:r>
+              <a:rPr lang="en-US" dirty="0" smtClean="0"/>
+              <a:t>How have we used </a:t>
+            </a:r>
+            <a:r>
+              <a:rPr lang="en-US" dirty="0" err="1" smtClean="0"/>
+              <a:t>Docker</a:t>
+            </a:r>
+            <a:r>
+              <a:rPr lang="en-US" dirty="0" smtClean="0"/>
+              <a:t>?</a:t>
+            </a:r>
+            <a:endParaRPr lang="en-US" dirty="0"/>
+          </a:p>
+        </p:txBody>
+      </p:sp>
+      <p:graphicFrame>
+        <p:nvGraphicFramePr>
+          <p:cNvPr id="3" name="Table 2"/>
+          <p:cNvGraphicFramePr>
+            <a:graphicFrameLocks noGrp="1"/>
+          </p:cNvGraphicFramePr>
+          <p:nvPr>
+            <p:extLst>
+              <p:ext uri="{D42A27DB-BD31-4B8C-83A1-F6EECF244321}">
+                <p14:modId xmlns:p14="http://schemas.microsoft.com/office/powerpoint/2010/main" val="1031239081"/>
+              </p:ext>
+            </p:extLst>
+          </p:nvPr>
+        </p:nvGraphicFramePr>
+        <p:xfrm>
+          <a:off x="444497" y="1213072"/>
+          <a:ext cx="8260633" cy="5848128"/>
+        </p:xfrm>
+        <a:graphic>
+          <a:graphicData uri="http://schemas.openxmlformats.org/drawingml/2006/table">
+            <a:tbl>
+              <a:tblPr firstRow="1" bandRow="1">
+                <a:tableStyleId>{2D5ABB26-0587-4C30-8999-92F81FD0307C}</a:tableStyleId>
+              </a:tblPr>
+              <a:tblGrid>
+                <a:gridCol w="3225803"/>
+                <a:gridCol w="5034830"/>
+              </a:tblGrid>
+              <a:tr h="1065986">
+                <a:tc>
+                  <a:txBody>
+                    <a:bodyPr/>
+                    <a:lstStyle/>
+                    <a:p>
+                      <a:r>
+                        <a:rPr lang="en-US" dirty="0" smtClean="0"/>
+                        <a:t>Running</a:t>
+                      </a:r>
+                      <a:r>
+                        <a:rPr lang="en-US" baseline="0" dirty="0" smtClean="0"/>
+                        <a:t> third party software packaged as “dockerized apps”</a:t>
+                      </a:r>
+                      <a:endParaRPr lang="en-US" b="0" dirty="0"/>
+                    </a:p>
+                  </a:txBody>
+                  <a:tcPr marL="182880" marT="91440" marB="91440"/>
+                </a:tc>
+                <a:tc>
+                  <a:txBody>
+                    <a:bodyPr/>
+                    <a:lstStyle/>
+                    <a:p>
+                      <a:r>
+                        <a:rPr lang="en-US" b="1" dirty="0" smtClean="0"/>
+                        <a:t>Sanger Cance</a:t>
+                      </a:r>
+                      <a:r>
+                        <a:rPr lang="en-US" b="1" baseline="0" dirty="0" smtClean="0"/>
+                        <a:t>r Genome Project analysis pipeline</a:t>
+                      </a:r>
+                    </a:p>
+                    <a:p>
+                      <a:pPr>
+                        <a:spcBef>
+                          <a:spcPts val="1200"/>
+                        </a:spcBef>
+                      </a:pPr>
+                      <a:r>
+                        <a:rPr lang="en-US" b="1" baseline="0" dirty="0" smtClean="0"/>
+                        <a:t>Polysolver</a:t>
+                      </a:r>
+                      <a:endParaRPr lang="en-US" b="1" dirty="0"/>
+                    </a:p>
+                  </a:txBody>
+                  <a:tcPr marL="182880" marT="91440" marB="91440"/>
+                </a:tc>
+              </a:tr>
+              <a:tr h="1065986">
+                <a:tc>
+                  <a:txBody>
+                    <a:bodyPr/>
+                    <a:lstStyle/>
+                    <a:p>
+                      <a:r>
+                        <a:rPr lang="en-US" dirty="0" smtClean="0"/>
+                        <a:t>Installing and running third</a:t>
+                      </a:r>
+                      <a:r>
+                        <a:rPr lang="en-US" baseline="0" dirty="0" smtClean="0"/>
+                        <a:t> party software</a:t>
+                      </a:r>
+                      <a:endParaRPr lang="en-US" b="0" dirty="0"/>
+                    </a:p>
+                  </a:txBody>
+                  <a:tcPr marL="182880" marT="91440" marB="91440"/>
+                </a:tc>
+                <a:tc>
+                  <a:txBody>
+                    <a:bodyPr/>
+                    <a:lstStyle/>
+                    <a:p>
+                      <a:r>
+                        <a:rPr lang="en-US" b="1" dirty="0" smtClean="0"/>
+                        <a:t>MutSigCV</a:t>
+                      </a:r>
+                      <a:endParaRPr lang="en-US" dirty="0"/>
+                    </a:p>
+                  </a:txBody>
+                  <a:tcPr marL="182880" marT="91440" marB="91440"/>
+                </a:tc>
+              </a:tr>
+              <a:tr h="1201729">
+                <a:tc>
+                  <a:txBody>
+                    <a:bodyPr/>
+                    <a:lstStyle/>
+                    <a:p>
+                      <a:r>
+                        <a:rPr lang="en-US" dirty="0" smtClean="0"/>
+                        <a:t>Deploying Shiny applications</a:t>
+                      </a:r>
+                      <a:endParaRPr lang="en-US" dirty="0"/>
+                    </a:p>
+                  </a:txBody>
+                  <a:tcPr marL="182880" marT="91440" marB="91440"/>
+                </a:tc>
+                <a:tc>
+                  <a:txBody>
+                    <a:bodyPr/>
+                    <a:lstStyle/>
+                    <a:p>
+                      <a:r>
+                        <a:rPr lang="en-US" b="1" dirty="0" smtClean="0"/>
+                        <a:t>Proteomics</a:t>
+                      </a:r>
+                      <a:r>
+                        <a:rPr lang="en-US" b="1" baseline="0" dirty="0" smtClean="0"/>
+                        <a:t> TMT analysis </a:t>
+                      </a:r>
+                      <a:r>
+                        <a:rPr lang="en-US" baseline="0" dirty="0" smtClean="0"/>
+                        <a:t>(Bioinformatics Core)</a:t>
+                      </a:r>
+                    </a:p>
+                    <a:p>
+                      <a:pPr>
+                        <a:spcBef>
+                          <a:spcPts val="600"/>
+                        </a:spcBef>
+                      </a:pPr>
+                      <a:r>
+                        <a:rPr lang="en-US" b="1" baseline="0" dirty="0" smtClean="0"/>
+                        <a:t>Breast Cancer PDTX Encyclopaedia </a:t>
+                      </a:r>
+                      <a:r>
+                        <a:rPr lang="en-US" baseline="0" dirty="0" smtClean="0"/>
+                        <a:t>(Caldas lab, Bioinformatics Core)</a:t>
+                      </a:r>
+                      <a:endParaRPr lang="en-US" dirty="0"/>
+                    </a:p>
+                  </a:txBody>
+                  <a:tcPr marL="182880" marT="91440" marB="91440"/>
+                </a:tc>
+              </a:tr>
+              <a:tr h="1448441">
+                <a:tc>
+                  <a:txBody>
+                    <a:bodyPr/>
+                    <a:lstStyle/>
+                    <a:p>
+                      <a:r>
+                        <a:rPr lang="en-US" dirty="0" smtClean="0"/>
+                        <a:t>Packaging and distributing</a:t>
+                      </a:r>
+                      <a:r>
+                        <a:rPr lang="en-US" baseline="0" dirty="0" smtClean="0"/>
+                        <a:t> tools developed in-house</a:t>
+                      </a:r>
+                      <a:endParaRPr lang="en-US" dirty="0"/>
+                    </a:p>
+                  </a:txBody>
+                  <a:tcPr marL="182880" marT="91440" marB="91440"/>
+                </a:tc>
+                <a:tc>
+                  <a:txBody>
+                    <a:bodyPr/>
+                    <a:lstStyle/>
+                    <a:p>
+                      <a:r>
+                        <a:rPr lang="en-US" dirty="0" err="1" smtClean="0"/>
+                        <a:t>Tumour</a:t>
+                      </a:r>
+                      <a:r>
+                        <a:rPr lang="en-US" baseline="0" dirty="0" smtClean="0"/>
+                        <a:t> </a:t>
+                      </a:r>
+                      <a:r>
+                        <a:rPr lang="en-US" baseline="0" dirty="0" err="1" smtClean="0"/>
+                        <a:t>clonality</a:t>
+                      </a:r>
+                      <a:r>
+                        <a:rPr lang="en-US" baseline="0" dirty="0" smtClean="0"/>
+                        <a:t> analysis for ICGC-TCGA-DREAM Challenge (Geoff </a:t>
+                      </a:r>
+                      <a:r>
+                        <a:rPr lang="en-US" baseline="0" dirty="0" err="1" smtClean="0"/>
+                        <a:t>MacIntyre</a:t>
+                      </a:r>
+                      <a:r>
+                        <a:rPr lang="en-US" baseline="0" dirty="0" smtClean="0"/>
+                        <a:t>)</a:t>
+                      </a:r>
+                    </a:p>
+                    <a:p>
+                      <a:pPr>
+                        <a:spcBef>
+                          <a:spcPts val="600"/>
+                        </a:spcBef>
+                      </a:pPr>
+                      <a:r>
+                        <a:rPr lang="en-US" b="1" baseline="0" dirty="0" err="1" smtClean="0"/>
+                        <a:t>ParaBam</a:t>
+                      </a:r>
+                      <a:r>
+                        <a:rPr lang="en-US" baseline="0" dirty="0" smtClean="0"/>
+                        <a:t> tool for optimized processing of BAM files (Henry </a:t>
+                      </a:r>
+                      <a:r>
+                        <a:rPr lang="en-US" baseline="0" dirty="0" err="1" smtClean="0"/>
+                        <a:t>Farmery</a:t>
+                      </a:r>
+                      <a:r>
+                        <a:rPr lang="en-US" baseline="0" dirty="0" smtClean="0"/>
+                        <a:t>)</a:t>
+                      </a:r>
+                      <a:endParaRPr lang="en-US" dirty="0"/>
+                    </a:p>
+                  </a:txBody>
+                  <a:tcPr marL="182880" marT="91440" marB="91440"/>
+                </a:tc>
+              </a:tr>
+              <a:tr h="1065986">
+                <a:tc>
+                  <a:txBody>
+                    <a:bodyPr/>
+                    <a:lstStyle/>
+                    <a:p>
+                      <a:r>
+                        <a:rPr lang="en-US" dirty="0" smtClean="0"/>
+                        <a:t>Training</a:t>
+                      </a:r>
+                      <a:endParaRPr lang="en-US" dirty="0"/>
+                    </a:p>
+                  </a:txBody>
+                  <a:tcPr marL="182880" marT="91440" marB="91440"/>
+                </a:tc>
+                <a:tc>
+                  <a:txBody>
+                    <a:bodyPr/>
+                    <a:lstStyle/>
+                    <a:p>
+                      <a:r>
+                        <a:rPr lang="en-US" dirty="0" smtClean="0"/>
+                        <a:t>CRUK</a:t>
+                      </a:r>
+                      <a:r>
+                        <a:rPr lang="en-US" baseline="0" dirty="0" smtClean="0"/>
+                        <a:t> Summer School on cancer genome analysis</a:t>
+                      </a:r>
+                      <a:endParaRPr lang="en-US" dirty="0"/>
+                    </a:p>
+                  </a:txBody>
+                  <a:tcPr marL="182880" marT="91440" marB="91440"/>
+                </a:tc>
+              </a:tr>
+            </a:tbl>
+          </a:graphicData>
+        </a:graphic>
+      </p:graphicFrame>
+    </p:spTree>
+    <p:extLst>
+      <p:ext uri="{BB962C8B-B14F-4D97-AF65-F5344CB8AC3E}">
+        <p14:creationId xmlns:p14="http://schemas.microsoft.com/office/powerpoint/2010/main" val="734422584"/>
       </p:ext>
     </p:extLst>
   </p:cSld>
@@ -3640,7 +4499,7 @@
             <a:r>
               <a:rPr lang="en-US" sz="2400" b="1" dirty="0" err="1" smtClean="0">
                 <a:solidFill>
-                  <a:schemeClr val="accent2"/>
+                  <a:srgbClr val="211F70"/>
                 </a:solidFill>
               </a:rPr>
               <a:t>Docker</a:t>
@@ -3648,7 +4507,7 @@
             <a:r>
               <a:rPr lang="en-US" sz="2400" dirty="0" smtClean="0">
                 <a:solidFill>
-                  <a:schemeClr val="accent2"/>
+                  <a:srgbClr val="211F70"/>
                 </a:solidFill>
               </a:rPr>
               <a:t> is a </a:t>
@@ -3656,7 +4515,7 @@
             <a:r>
               <a:rPr lang="en-US" sz="2400" i="1" dirty="0" smtClean="0">
                 <a:solidFill>
-                  <a:schemeClr val="accent2"/>
+                  <a:srgbClr val="211F70"/>
                 </a:solidFill>
               </a:rPr>
               <a:t>“container system for wrapping a piece of software in a complete file system with everything it needs to run”</a:t>
@@ -3752,6 +4611,66 @@
           </a:prstGeom>
         </p:spPr>
       </p:pic>
+      <p:sp>
+        <p:nvSpPr>
+          <p:cNvPr id="4" name="TextBox 3"/>
+          <p:cNvSpPr txBox="1"/>
+          <p:nvPr/>
+        </p:nvSpPr>
+        <p:spPr>
+          <a:xfrm>
+            <a:off x="457200" y="6350265"/>
+            <a:ext cx="7152218" cy="338554"/>
+          </a:xfrm>
+          <a:prstGeom prst="rect">
+            <a:avLst/>
+          </a:prstGeom>
+          <a:noFill/>
+        </p:spPr>
+        <p:txBody>
+          <a:bodyPr wrap="none" rtlCol="0">
+            <a:spAutoFit/>
+          </a:bodyPr>
+          <a:lstStyle/>
+          <a:p>
+            <a:r>
+              <a:rPr lang="en-US" sz="1600" dirty="0" smtClean="0"/>
+              <a:t>Image from </a:t>
+            </a:r>
+            <a:r>
+              <a:rPr lang="en-US" sz="1600" dirty="0" err="1" smtClean="0"/>
+              <a:t>Docker</a:t>
+            </a:r>
+            <a:r>
+              <a:rPr lang="en-US" sz="1600" dirty="0"/>
+              <a:t> </a:t>
+            </a:r>
+            <a:r>
+              <a:rPr lang="en-US" sz="1600" dirty="0" smtClean="0"/>
+              <a:t>website </a:t>
+            </a:r>
+            <a:r>
+              <a:rPr lang="en-US" sz="1600" dirty="0" smtClean="0">
+                <a:hlinkClick r:id="rId3"/>
+              </a:rPr>
+              <a:t>https</a:t>
+            </a:r>
+            <a:r>
+              <a:rPr lang="en-US" sz="1600" dirty="0">
+                <a:hlinkClick r:id="rId3"/>
+              </a:rPr>
+              <a:t>://docs.docker.com/engine/understanding-</a:t>
+            </a:r>
+            <a:r>
+              <a:rPr lang="en-US" sz="1600" dirty="0" smtClean="0">
+                <a:hlinkClick r:id="rId3"/>
+              </a:rPr>
+              <a:t>docker</a:t>
+            </a:r>
+            <a:endParaRPr lang="en-US" sz="1600" dirty="0" smtClean="0"/>
+          </a:p>
+        </p:txBody>
+      </p:sp>
     </p:spTree>
     <p:extLst>
       <p:ext uri="{BB962C8B-B14F-4D97-AF65-F5344CB8AC3E}">
@@ -3882,6 +4801,17 @@
           <a:prstGeom prst="rect">
             <a:avLst/>
           </a:prstGeom>
+          <a:solidFill>
+            <a:schemeClr val="accent2">
+              <a:lumMod val="60000"/>
+              <a:lumOff val="40000"/>
+            </a:schemeClr>
+          </a:solidFill>
+          <a:ln>
+            <a:solidFill>
+              <a:schemeClr val="accent2"/>
+            </a:solidFill>
+          </a:ln>
         </p:spPr>
         <p:style>
           <a:lnRef idx="2">
@@ -3925,6 +4855,17 @@
           <a:prstGeom prst="rect">
             <a:avLst/>
           </a:prstGeom>
+          <a:solidFill>
+            <a:schemeClr val="accent2">
+              <a:lumMod val="60000"/>
+              <a:lumOff val="40000"/>
+            </a:schemeClr>
+          </a:solidFill>
+          <a:ln>
+            <a:solidFill>
+              <a:schemeClr val="accent2"/>
+            </a:solidFill>
+          </a:ln>
         </p:spPr>
         <p:style>
           <a:lnRef idx="2">
@@ -3969,9 +4910,7 @@
             <a:avLst/>
           </a:prstGeom>
           <a:solidFill>
-            <a:schemeClr val="accent2">
-              <a:lumMod val="75000"/>
-            </a:schemeClr>
+            <a:schemeClr val="accent2"/>
           </a:solidFill>
           <a:ln>
             <a:solidFill>
@@ -4026,9 +4965,7 @@
             <a:avLst/>
           </a:prstGeom>
           <a:solidFill>
-            <a:schemeClr val="accent2">
-              <a:lumMod val="75000"/>
-            </a:schemeClr>
+            <a:schemeClr val="accent2"/>
           </a:solidFill>
           <a:ln>
             <a:solidFill>
@@ -4091,9 +5028,7 @@
             <a:avLst/>
           </a:prstGeom>
           <a:solidFill>
-            <a:schemeClr val="accent2">
-              <a:lumMod val="75000"/>
-            </a:schemeClr>
+            <a:schemeClr val="accent2"/>
           </a:solidFill>
           <a:ln>
             <a:solidFill>
@@ -4148,9 +5083,7 @@
             <a:avLst/>
           </a:prstGeom>
           <a:solidFill>
-            <a:schemeClr val="accent2">
-              <a:lumMod val="75000"/>
-            </a:schemeClr>
+            <a:schemeClr val="accent2"/>
           </a:solidFill>
           <a:ln>
             <a:solidFill>
@@ -4209,9 +5142,7 @@
             <a:avLst/>
           </a:prstGeom>
           <a:solidFill>
-            <a:schemeClr val="accent2">
-              <a:lumMod val="75000"/>
-            </a:schemeClr>
+            <a:schemeClr val="accent2"/>
           </a:solidFill>
           <a:ln>
             <a:solidFill>
@@ -4266,9 +5197,7 @@
             <a:avLst/>
           </a:prstGeom>
           <a:solidFill>
-            <a:schemeClr val="accent2">
-              <a:lumMod val="75000"/>
-            </a:schemeClr>
+            <a:schemeClr val="accent2"/>
           </a:solidFill>
           <a:ln>
             <a:solidFill>
@@ -4323,9 +5252,7 @@
             <a:avLst/>
           </a:prstGeom>
           <a:solidFill>
-            <a:schemeClr val="accent2">
-              <a:lumMod val="75000"/>
-            </a:schemeClr>
+            <a:schemeClr val="accent2"/>
           </a:solidFill>
           <a:ln>
             <a:solidFill>
@@ -4380,9 +5307,7 @@
             <a:avLst/>
           </a:prstGeom>
           <a:solidFill>
-            <a:schemeClr val="accent2">
-              <a:lumMod val="75000"/>
-            </a:schemeClr>
+            <a:schemeClr val="accent2"/>
           </a:solidFill>
           <a:ln>
             <a:solidFill>
@@ -4545,7 +5470,19 @@
           <a:p>
             <a:r>
               <a:rPr lang="en-US" dirty="0" err="1" smtClean="0"/>
-              <a:t>Dockerfile</a:t>
+              <a:t>Docker</a:t>
+            </a:r>
+            <a:r>
+              <a:rPr lang="en-US" dirty="0"/>
+              <a:t> </a:t>
+            </a:r>
+            <a:r>
+              <a:rPr lang="en-US" dirty="0" smtClean="0"/>
+              <a:t>in </a:t>
+            </a:r>
+            <a:r>
+              <a:rPr lang="en-US" dirty="0" smtClean="0"/>
+              <a:t>practice</a:t>
             </a:r>
             <a:endParaRPr lang="en-US" dirty="0"/>
           </a:p>
@@ -4553,402 +5490,208 @@
       </p:sp>
       <p:sp>
         <p:nvSpPr>
-          <p:cNvPr id="3" name="TextBox 2"/>
-          <p:cNvSpPr txBox="1"/>
-          <p:nvPr/>
-        </p:nvSpPr>
-        <p:spPr>
-          <a:xfrm>
-            <a:off x="326259" y="1316553"/>
-            <a:ext cx="8395497" cy="4647425"/>
-          </a:xfrm>
-          <a:prstGeom prst="rect">
-            <a:avLst/>
-          </a:prstGeom>
-          <a:noFill/>
-        </p:spPr>
-        <p:txBody>
-          <a:bodyPr wrap="square" rtlCol="0">
-            <a:spAutoFit/>
-          </a:bodyPr>
+          <p:cNvPr id="3" name="Content Placeholder 2"/>
+          <p:cNvSpPr>
+            <a:spLocks noGrp="1"/>
+          </p:cNvSpPr>
+          <p:nvPr>
+            <p:ph idx="1"/>
+          </p:nvPr>
+        </p:nvSpPr>
+        <p:spPr/>
+        <p:txBody>
+          <a:bodyPr/>
           <a:lstStyle/>
           <a:p>
-            <a:r>
-              <a:rPr lang="en-US" sz="2000" b="1" dirty="0" smtClean="0">
-                <a:solidFill>
-                  <a:schemeClr val="accent1"/>
-                </a:solidFill>
-                <a:cs typeface="Courier"/>
-              </a:rPr>
-              <a:t>Shiny server</a:t>
-            </a:r>
+            <a:pPr marL="0" indent="0">
+              <a:buNone/>
+            </a:pPr>
+            <a:r>
+              <a:rPr lang="en-US" sz="2400" dirty="0" smtClean="0"/>
+              <a:t>Pull an image from a </a:t>
+            </a:r>
+            <a:r>
+              <a:rPr lang="en-US" sz="2400" dirty="0" smtClean="0"/>
+              <a:t>repository</a:t>
+            </a:r>
+            <a:endParaRPr lang="en-US" sz="2000" dirty="0"/>
+          </a:p>
+          <a:p>
+            <a:pPr marL="0" indent="0">
+              <a:buNone/>
+            </a:pPr>
             <a:endParaRPr lang="en-US" sz="2000" b="1" dirty="0" smtClean="0">
-              <a:solidFill>
-                <a:schemeClr val="accent1"/>
-              </a:solidFill>
-              <a:cs typeface="Courier"/>
-            </a:endParaRPr>
-          </a:p>
-          <a:p>
-            <a:endParaRPr lang="en-US" sz="1200" dirty="0" smtClean="0">
               <a:latin typeface="Courier"/>
               <a:cs typeface="Courier"/>
             </a:endParaRPr>
           </a:p>
           <a:p>
-            <a:endParaRPr lang="en-US" sz="1200" dirty="0">
+            <a:pPr marL="0" indent="0">
+              <a:buNone/>
+            </a:pPr>
+            <a:r>
+              <a:rPr lang="en-US" sz="2000" b="1" dirty="0" err="1" smtClean="0">
+                <a:latin typeface="Courier"/>
+                <a:cs typeface="Courier"/>
+              </a:rPr>
+              <a:t>docker</a:t>
+            </a:r>
+            <a:r>
+              <a:rPr lang="en-US" sz="2000" b="1" dirty="0" smtClean="0">
+                <a:latin typeface="Courier"/>
+                <a:cs typeface="Courier"/>
+              </a:rPr>
+              <a:t> </a:t>
+            </a:r>
+            <a:r>
+              <a:rPr lang="en-US" sz="2000" b="1" dirty="0" smtClean="0">
+                <a:latin typeface="Courier"/>
+                <a:cs typeface="Courier"/>
+              </a:rPr>
+              <a:t>pull </a:t>
+            </a:r>
+            <a:r>
+              <a:rPr lang="en-US" sz="2000" b="1" dirty="0" err="1" smtClean="0">
+                <a:latin typeface="Courier"/>
+                <a:cs typeface="Courier"/>
+              </a:rPr>
+              <a:t>bioconductor</a:t>
+            </a:r>
+            <a:r>
+              <a:rPr lang="en-US" sz="2000" b="1" dirty="0" smtClean="0">
+                <a:latin typeface="Courier"/>
+                <a:cs typeface="Courier"/>
+              </a:rPr>
+              <a:t>/</a:t>
+            </a:r>
+            <a:r>
+              <a:rPr lang="en-US" sz="2000" b="1" dirty="0" err="1" smtClean="0">
+                <a:latin typeface="Courier"/>
+                <a:cs typeface="Courier"/>
+              </a:rPr>
+              <a:t>release_base</a:t>
+            </a:r>
+            <a:endParaRPr lang="en-US" sz="2000" b="1" dirty="0" smtClean="0">
               <a:latin typeface="Courier"/>
               <a:cs typeface="Courier"/>
             </a:endParaRPr>
           </a:p>
           <a:p>
-            <a:r>
-              <a:rPr lang="en-US" sz="1200" dirty="0" smtClean="0">
-                <a:latin typeface="Courier"/>
-                <a:cs typeface="Courier"/>
-              </a:rPr>
-              <a:t>FROM </a:t>
-            </a:r>
-            <a:r>
-              <a:rPr lang="en-US" sz="1200" dirty="0">
-                <a:latin typeface="Courier"/>
-                <a:cs typeface="Courier"/>
-              </a:rPr>
-              <a:t>centos:7</a:t>
-            </a:r>
-          </a:p>
-          <a:p>
-            <a:endParaRPr lang="en-US" sz="1200" dirty="0">
+            <a:pPr marL="0" indent="0">
+              <a:buNone/>
+            </a:pPr>
+            <a:endParaRPr lang="en-US" sz="2400" dirty="0" smtClean="0"/>
+          </a:p>
+          <a:p>
+            <a:pPr marL="0" indent="0">
+              <a:buNone/>
+            </a:pPr>
+            <a:endParaRPr lang="en-US" sz="2400" dirty="0" smtClean="0"/>
+          </a:p>
+          <a:p>
+            <a:pPr marL="0" indent="0">
+              <a:buNone/>
+            </a:pPr>
+            <a:r>
+              <a:rPr lang="en-US" sz="2400" dirty="0" smtClean="0"/>
+              <a:t>Run </a:t>
+            </a:r>
+            <a:r>
+              <a:rPr lang="en-US" sz="2400" dirty="0" smtClean="0"/>
+              <a:t>a command within a new container based on this </a:t>
+            </a:r>
+            <a:r>
+              <a:rPr lang="en-US" sz="2400" dirty="0" smtClean="0"/>
+              <a:t>image</a:t>
+            </a:r>
+            <a:endParaRPr lang="en-US" sz="1800" b="1" dirty="0" smtClean="0">
               <a:latin typeface="Courier"/>
               <a:cs typeface="Courier"/>
             </a:endParaRPr>
           </a:p>
           <a:p>
-            <a:r>
-              <a:rPr lang="en-US" sz="1200" dirty="0">
-                <a:latin typeface="Courier"/>
-                <a:cs typeface="Courier"/>
-              </a:rPr>
-              <a:t>RUN yum </a:t>
-            </a:r>
-            <a:r>
-              <a:rPr lang="en-US" sz="1200" dirty="0" err="1">
-                <a:latin typeface="Courier"/>
-                <a:cs typeface="Courier"/>
-              </a:rPr>
-              <a:t>groupinstall</a:t>
-            </a:r>
-            <a:r>
-              <a:rPr lang="en-US" sz="1200" dirty="0">
-                <a:latin typeface="Courier"/>
-                <a:cs typeface="Courier"/>
-              </a:rPr>
-              <a:t> -y 'development tools'</a:t>
-            </a:r>
-          </a:p>
-          <a:p>
-            <a:r>
-              <a:rPr lang="en-US" sz="1200" dirty="0">
-                <a:latin typeface="Courier"/>
-                <a:cs typeface="Courier"/>
-              </a:rPr>
-              <a:t>RUN yum install -y </a:t>
-            </a:r>
-            <a:r>
-              <a:rPr lang="en-US" sz="1200" dirty="0" err="1" smtClean="0">
-                <a:latin typeface="Courier"/>
-                <a:cs typeface="Courier"/>
-              </a:rPr>
-              <a:t>wget</a:t>
-            </a:r>
-            <a:endParaRPr lang="en-US" sz="1200" dirty="0" smtClean="0">
+            <a:pPr marL="0" indent="0">
+              <a:buNone/>
+            </a:pPr>
+            <a:endParaRPr lang="en-US" sz="2000" b="1" dirty="0" smtClean="0">
               <a:latin typeface="Courier"/>
               <a:cs typeface="Courier"/>
             </a:endParaRPr>
           </a:p>
           <a:p>
-            <a:endParaRPr lang="en-US" sz="1200" dirty="0">
+            <a:pPr marL="0" indent="0">
+              <a:buNone/>
+            </a:pPr>
+            <a:r>
+              <a:rPr lang="en-US" sz="2000" b="1" dirty="0" err="1" smtClean="0">
+                <a:latin typeface="Courier"/>
+                <a:cs typeface="Courier"/>
+              </a:rPr>
+              <a:t>docker</a:t>
+            </a:r>
+            <a:r>
+              <a:rPr lang="en-US" sz="2000" b="1" dirty="0" smtClean="0">
+                <a:latin typeface="Courier"/>
+                <a:cs typeface="Courier"/>
+              </a:rPr>
+              <a:t> </a:t>
+            </a:r>
+            <a:r>
+              <a:rPr lang="en-US" sz="2000" b="1" dirty="0" smtClean="0">
+                <a:latin typeface="Courier"/>
+                <a:cs typeface="Courier"/>
+              </a:rPr>
+              <a:t>run </a:t>
+            </a:r>
+            <a:r>
+              <a:rPr lang="en-US" sz="2000" b="1" dirty="0" smtClean="0">
+                <a:latin typeface="Courier"/>
+                <a:cs typeface="Courier"/>
+              </a:rPr>
+              <a:t>-it </a:t>
+            </a:r>
+            <a:r>
+              <a:rPr lang="en-US" sz="2000" b="1" dirty="0" err="1" smtClean="0">
+                <a:latin typeface="Courier"/>
+                <a:cs typeface="Courier"/>
+              </a:rPr>
+              <a:t>bioconductor</a:t>
+            </a:r>
+            <a:r>
+              <a:rPr lang="en-US" sz="2000" b="1" dirty="0">
+                <a:latin typeface="Courier"/>
+                <a:cs typeface="Courier"/>
+              </a:rPr>
+              <a:t>/</a:t>
+            </a:r>
+            <a:r>
+              <a:rPr lang="en-US" sz="2000" b="1" dirty="0" err="1" smtClean="0">
+                <a:latin typeface="Courier"/>
+                <a:cs typeface="Courier"/>
+              </a:rPr>
+              <a:t>release_base</a:t>
+            </a:r>
+            <a:r>
+              <a:rPr lang="en-US" sz="2000" b="1" dirty="0" smtClean="0">
+                <a:latin typeface="Courier"/>
+                <a:cs typeface="Courier"/>
+              </a:rPr>
+              <a:t> R</a:t>
+            </a:r>
+            <a:endParaRPr lang="en-US" sz="2000" b="1" dirty="0">
               <a:latin typeface="Courier"/>
               <a:cs typeface="Courier"/>
             </a:endParaRPr>
           </a:p>
           <a:p>
-            <a:r>
-              <a:rPr lang="en-US" sz="1200" dirty="0">
-                <a:latin typeface="Courier"/>
-                <a:cs typeface="Courier"/>
-              </a:rPr>
-              <a:t>RUN rpm -</a:t>
-            </a:r>
-            <a:r>
-              <a:rPr lang="en-US" sz="1200" dirty="0" err="1">
-                <a:latin typeface="Courier"/>
-                <a:cs typeface="Courier"/>
-              </a:rPr>
-              <a:t>Uvh</a:t>
-            </a:r>
-            <a:r>
-              <a:rPr lang="en-US" sz="1200" dirty="0">
-                <a:latin typeface="Courier"/>
-                <a:cs typeface="Courier"/>
-              </a:rPr>
-              <a:t> https://</a:t>
-            </a:r>
-            <a:r>
-              <a:rPr lang="en-US" sz="1200" dirty="0" err="1">
-                <a:latin typeface="Courier"/>
-                <a:cs typeface="Courier"/>
-              </a:rPr>
-              <a:t>dl.fedoraproject.org</a:t>
-            </a:r>
-            <a:r>
-              <a:rPr lang="en-US" sz="1200" dirty="0">
-                <a:latin typeface="Courier"/>
-                <a:cs typeface="Courier"/>
-              </a:rPr>
-              <a:t>/pub/</a:t>
-            </a:r>
-            <a:r>
-              <a:rPr lang="en-US" sz="1200" dirty="0" err="1">
-                <a:latin typeface="Courier"/>
-                <a:cs typeface="Courier"/>
-              </a:rPr>
-              <a:t>epel</a:t>
-            </a:r>
-            <a:r>
-              <a:rPr lang="en-US" sz="1200" dirty="0">
-                <a:latin typeface="Courier"/>
-                <a:cs typeface="Courier"/>
-              </a:rPr>
-              <a:t>/epel-release-latest-7.noarch.rpm</a:t>
-            </a:r>
-          </a:p>
-          <a:p>
-            <a:r>
-              <a:rPr lang="en-US" sz="1200" dirty="0">
-                <a:latin typeface="Courier"/>
-                <a:cs typeface="Courier"/>
-              </a:rPr>
-              <a:t>RUN yum install -y R</a:t>
-            </a:r>
-          </a:p>
-          <a:p>
-            <a:endParaRPr lang="en-US" sz="1200" dirty="0">
-              <a:latin typeface="Courier"/>
-              <a:cs typeface="Courier"/>
-            </a:endParaRPr>
-          </a:p>
-          <a:p>
-            <a:r>
-              <a:rPr lang="en-US" sz="1200" dirty="0">
-                <a:latin typeface="Courier"/>
-                <a:cs typeface="Courier"/>
-              </a:rPr>
-              <a:t>RUN R -e "</a:t>
-            </a:r>
-            <a:r>
-              <a:rPr lang="en-US" sz="1200" dirty="0" err="1">
-                <a:latin typeface="Courier"/>
-                <a:cs typeface="Courier"/>
-              </a:rPr>
-              <a:t>install.packages</a:t>
-            </a:r>
-            <a:r>
-              <a:rPr lang="en-US" sz="1200" dirty="0">
-                <a:latin typeface="Courier"/>
-                <a:cs typeface="Courier"/>
-              </a:rPr>
-              <a:t>(c('shiny', '</a:t>
-            </a:r>
-            <a:r>
-              <a:rPr lang="en-US" sz="1200" dirty="0" err="1">
-                <a:latin typeface="Courier"/>
-                <a:cs typeface="Courier"/>
-              </a:rPr>
-              <a:t>rmarkdown</a:t>
-            </a:r>
-            <a:r>
-              <a:rPr lang="en-US" sz="1200" dirty="0">
-                <a:latin typeface="Courier"/>
-                <a:cs typeface="Courier"/>
-              </a:rPr>
-              <a:t>'), repos='https://</a:t>
-            </a:r>
-            <a:r>
-              <a:rPr lang="en-US" sz="1200" dirty="0" err="1">
-                <a:latin typeface="Courier"/>
-                <a:cs typeface="Courier"/>
-              </a:rPr>
-              <a:t>cran.rstudio.com</a:t>
-            </a:r>
-            <a:r>
-              <a:rPr lang="en-US" sz="1200" dirty="0">
-                <a:latin typeface="Courier"/>
-                <a:cs typeface="Courier"/>
-              </a:rPr>
-              <a:t>')"</a:t>
-            </a:r>
-          </a:p>
-          <a:p>
-            <a:r>
-              <a:rPr lang="en-US" sz="1200" dirty="0">
-                <a:latin typeface="Courier"/>
-                <a:cs typeface="Courier"/>
-              </a:rPr>
-              <a:t>RUN R -e "</a:t>
-            </a:r>
-            <a:r>
-              <a:rPr lang="en-US" sz="1200" dirty="0" err="1">
-                <a:latin typeface="Courier"/>
-                <a:cs typeface="Courier"/>
-              </a:rPr>
-              <a:t>install.packages</a:t>
-            </a:r>
-            <a:r>
-              <a:rPr lang="en-US" sz="1200" dirty="0">
-                <a:latin typeface="Courier"/>
-                <a:cs typeface="Courier"/>
-              </a:rPr>
-              <a:t>('</a:t>
-            </a:r>
-            <a:r>
-              <a:rPr lang="en-US" sz="1200" dirty="0" err="1">
-                <a:latin typeface="Courier"/>
-                <a:cs typeface="Courier"/>
-              </a:rPr>
-              <a:t>devtools</a:t>
-            </a:r>
-            <a:r>
-              <a:rPr lang="en-US" sz="1200" dirty="0">
-                <a:latin typeface="Courier"/>
-                <a:cs typeface="Courier"/>
-              </a:rPr>
-              <a:t>', repos='http://</a:t>
-            </a:r>
-            <a:r>
-              <a:rPr lang="en-US" sz="1200" dirty="0" err="1">
-                <a:latin typeface="Courier"/>
-                <a:cs typeface="Courier"/>
-              </a:rPr>
-              <a:t>mirrors.ebi.ac.uk</a:t>
-            </a:r>
-            <a:r>
-              <a:rPr lang="en-US" sz="1200" dirty="0">
-                <a:latin typeface="Courier"/>
-                <a:cs typeface="Courier"/>
-              </a:rPr>
-              <a:t>/CRAN')"</a:t>
-            </a:r>
-          </a:p>
-          <a:p>
-            <a:endParaRPr lang="en-US" sz="1200" dirty="0">
-              <a:latin typeface="Courier"/>
-              <a:cs typeface="Courier"/>
-            </a:endParaRPr>
-          </a:p>
-          <a:p>
-            <a:r>
-              <a:rPr lang="en-US" sz="1200" dirty="0">
-                <a:latin typeface="Courier"/>
-                <a:cs typeface="Courier"/>
-              </a:rPr>
-              <a:t>RUN </a:t>
-            </a:r>
-            <a:r>
-              <a:rPr lang="en-US" sz="1200" dirty="0" err="1">
-                <a:latin typeface="Courier"/>
-                <a:cs typeface="Courier"/>
-              </a:rPr>
-              <a:t>wget</a:t>
-            </a:r>
-            <a:r>
-              <a:rPr lang="en-US" sz="1200" dirty="0">
-                <a:latin typeface="Courier"/>
-                <a:cs typeface="Courier"/>
-              </a:rPr>
-              <a:t> https://download3.rstudio.org/centos6.3/x86_64/shiny-server-1.5.0.730-rh6-x86_64.rpm</a:t>
-            </a:r>
-          </a:p>
-          <a:p>
-            <a:r>
-              <a:rPr lang="en-US" sz="1200" dirty="0">
-                <a:latin typeface="Courier"/>
-                <a:cs typeface="Courier"/>
-              </a:rPr>
-              <a:t>RUN yum install -y --</a:t>
-            </a:r>
-            <a:r>
-              <a:rPr lang="en-US" sz="1200" dirty="0" err="1">
-                <a:latin typeface="Courier"/>
-                <a:cs typeface="Courier"/>
-              </a:rPr>
-              <a:t>nogpgcheck</a:t>
-            </a:r>
-            <a:r>
-              <a:rPr lang="en-US" sz="1200" dirty="0">
-                <a:latin typeface="Courier"/>
-                <a:cs typeface="Courier"/>
-              </a:rPr>
-              <a:t> shiny-server-1.5.0.730-rh6-x86_64.rpm</a:t>
-            </a:r>
-          </a:p>
-          <a:p>
-            <a:endParaRPr lang="en-US" sz="1200" dirty="0">
-              <a:latin typeface="Courier"/>
-              <a:cs typeface="Courier"/>
-            </a:endParaRPr>
-          </a:p>
-          <a:p>
-            <a:r>
-              <a:rPr lang="sk-SK" sz="1200" dirty="0">
-                <a:latin typeface="Courier"/>
-                <a:cs typeface="Courier"/>
-              </a:rPr>
-              <a:t>EXPOSE 3838</a:t>
-            </a:r>
-          </a:p>
-          <a:p>
-            <a:endParaRPr lang="sk-SK" sz="1200" dirty="0">
-              <a:latin typeface="Courier"/>
-              <a:cs typeface="Courier"/>
-            </a:endParaRPr>
-          </a:p>
-          <a:p>
-            <a:r>
-              <a:rPr lang="sk-SK" sz="1200" dirty="0">
-                <a:latin typeface="Courier"/>
-                <a:cs typeface="Courier"/>
-              </a:rPr>
-              <a:t>COPY shiny-server.sh /usr/bin/shiny-server.sh</a:t>
-            </a:r>
-          </a:p>
-          <a:p>
-            <a:endParaRPr lang="sk-SK" sz="1200" dirty="0">
-              <a:latin typeface="Courier"/>
-              <a:cs typeface="Courier"/>
-            </a:endParaRPr>
-          </a:p>
-          <a:p>
-            <a:r>
-              <a:rPr lang="sk-SK" sz="1200" dirty="0">
-                <a:latin typeface="Courier"/>
-                <a:cs typeface="Courier"/>
-              </a:rPr>
-              <a:t>CMD ["/usr/bin/shiny-server.sh"]</a:t>
-            </a:r>
-          </a:p>
-          <a:p>
-            <a:endParaRPr lang="en-US" sz="1200" dirty="0">
-              <a:latin typeface="Courier"/>
-              <a:cs typeface="Courier"/>
-            </a:endParaRPr>
+            <a:endParaRPr lang="en-US" dirty="0"/>
           </a:p>
         </p:txBody>
       </p:sp>
     </p:spTree>
     <p:extLst>
       <p:ext uri="{BB962C8B-B14F-4D97-AF65-F5344CB8AC3E}">
-        <p14:creationId xmlns:p14="http://schemas.microsoft.com/office/powerpoint/2010/main" val="426652869"/>
+        <p14:creationId xmlns:p14="http://schemas.microsoft.com/office/powerpoint/2010/main" val="3470007694"/>
       </p:ext>
     </p:extLst>
   </p:cSld>
@@ -4998,250 +5741,324 @@
           <a:lstStyle/>
           <a:p>
             <a:r>
-              <a:rPr lang="en-US" dirty="0" err="1" smtClean="0"/>
-              <a:t>Docker</a:t>
-            </a:r>
-            <a:r>
               <a:rPr lang="en-US" dirty="0" smtClean="0"/>
-              <a:t> </a:t>
-            </a:r>
-            <a:r>
-              <a:rPr lang="en-US" dirty="0" err="1" smtClean="0"/>
-              <a:t>vs</a:t>
-            </a:r>
-            <a:r>
-              <a:rPr lang="en-US" dirty="0" smtClean="0"/>
-              <a:t> Virtual Machines</a:t>
+              <a:t>Building an image</a:t>
             </a:r>
             <a:endParaRPr lang="en-US" dirty="0"/>
           </a:p>
         </p:txBody>
       </p:sp>
-      <p:pic>
-        <p:nvPicPr>
-          <p:cNvPr id="4" name="Picture 3"/>
-          <p:cNvPicPr>
-            <a:picLocks noChangeAspect="1"/>
-          </p:cNvPicPr>
-          <p:nvPr/>
-        </p:nvPicPr>
-        <p:blipFill rotWithShape="1">
-          <a:blip r:embed="rId2"/>
-          <a:srcRect b="9192"/>
-          <a:stretch/>
-        </p:blipFill>
+      <p:sp>
+        <p:nvSpPr>
+          <p:cNvPr id="3" name="Content Placeholder 2"/>
+          <p:cNvSpPr>
+            <a:spLocks noGrp="1"/>
+          </p:cNvSpPr>
+          <p:nvPr>
+            <p:ph idx="1"/>
+          </p:nvPr>
+        </p:nvSpPr>
         <p:spPr>
           <a:xfrm>
-            <a:off x="538764" y="1458398"/>
-            <a:ext cx="8128000" cy="3609733"/>
+            <a:off x="457200" y="1328200"/>
+            <a:ext cx="8229600" cy="5285229"/>
           </a:xfrm>
-          <a:prstGeom prst="rect">
-            <a:avLst/>
-          </a:prstGeom>
         </p:spPr>
-      </p:pic>
-      <p:sp>
-        <p:nvSpPr>
-          <p:cNvPr id="5" name="TextBox 4"/>
-          <p:cNvSpPr txBox="1"/>
-          <p:nvPr/>
-        </p:nvSpPr>
-        <p:spPr>
-          <a:xfrm>
-            <a:off x="792345" y="1153433"/>
-            <a:ext cx="1813317" cy="369332"/>
-          </a:xfrm>
-          <a:prstGeom prst="rect">
-            <a:avLst/>
-          </a:prstGeom>
-          <a:noFill/>
-        </p:spPr>
-        <p:txBody>
-          <a:bodyPr wrap="none" rtlCol="0">
-            <a:spAutoFit/>
+        <p:txBody>
+          <a:bodyPr>
+            <a:normAutofit/>
           </a:bodyPr>
           <a:lstStyle/>
           <a:p>
-            <a:r>
-              <a:rPr lang="en-US" b="1" dirty="0" smtClean="0">
-                <a:solidFill>
-                  <a:schemeClr val="accent2"/>
-                </a:solidFill>
-              </a:rPr>
-              <a:t>Virtual Machines</a:t>
-            </a:r>
-            <a:endParaRPr lang="en-US" b="1" dirty="0">
+            <a:pPr marL="0" indent="0">
+              <a:buNone/>
+            </a:pPr>
+            <a:r>
+              <a:rPr lang="en-US" sz="2000" dirty="0" smtClean="0">
+                <a:effectLst>
+                  <a:glow rad="228600">
+                    <a:schemeClr val="accent4">
+                      <a:satMod val="175000"/>
+                      <a:alpha val="40000"/>
+                    </a:schemeClr>
+                  </a:glow>
+                </a:effectLst>
+              </a:rPr>
+              <a:t>1 </a:t>
+            </a:r>
+            <a:r>
+              <a:rPr lang="en-US" sz="2000" dirty="0" smtClean="0"/>
+              <a:t> </a:t>
+            </a:r>
+            <a:r>
+              <a:rPr lang="en-US" sz="2000" dirty="0" smtClean="0"/>
+              <a:t>Start from an existing image, e.g. the base </a:t>
+            </a:r>
+            <a:r>
+              <a:rPr lang="en-US" sz="2000" dirty="0" err="1" smtClean="0"/>
+              <a:t>CentOS</a:t>
+            </a:r>
+            <a:r>
+              <a:rPr lang="en-US" sz="2000" dirty="0" smtClean="0"/>
+              <a:t> image, and create a container running a shell</a:t>
+            </a:r>
+            <a:endParaRPr lang="en-US" sz="2000" dirty="0"/>
+          </a:p>
+          <a:p>
+            <a:pPr marL="0" indent="0">
+              <a:spcBef>
+                <a:spcPts val="1224"/>
+              </a:spcBef>
+              <a:buNone/>
+            </a:pPr>
+            <a:r>
+              <a:rPr lang="en-US" sz="2000" b="1" dirty="0" err="1" smtClean="0">
+                <a:latin typeface="Courier"/>
+                <a:cs typeface="Courier"/>
+              </a:rPr>
+              <a:t>docker</a:t>
+            </a:r>
+            <a:r>
+              <a:rPr lang="en-US" sz="2000" b="1" dirty="0" smtClean="0">
+                <a:latin typeface="Courier"/>
+                <a:cs typeface="Courier"/>
+              </a:rPr>
+              <a:t> run -it centos bash</a:t>
+            </a:r>
+            <a:endParaRPr lang="en-US" sz="2000" b="1" dirty="0" smtClean="0">
+              <a:latin typeface="Courier"/>
+              <a:cs typeface="Courier"/>
+            </a:endParaRPr>
+          </a:p>
+          <a:p>
+            <a:pPr marL="0" indent="0">
+              <a:spcBef>
+                <a:spcPts val="2424"/>
+              </a:spcBef>
+              <a:buNone/>
+            </a:pPr>
+            <a:r>
+              <a:rPr lang="en-US" sz="2000" dirty="0" smtClean="0">
+                <a:effectLst>
+                  <a:glow rad="228600">
+                    <a:schemeClr val="accent4">
+                      <a:satMod val="175000"/>
+                      <a:alpha val="40000"/>
+                    </a:schemeClr>
+                  </a:glow>
+                </a:effectLst>
+              </a:rPr>
+              <a:t>2</a:t>
+            </a:r>
+            <a:r>
+              <a:rPr lang="en-US" sz="2000" dirty="0" smtClean="0"/>
+              <a:t>  Install new software, add data files, etc.</a:t>
+            </a:r>
+            <a:endParaRPr lang="en-US" sz="2000" dirty="0" smtClean="0"/>
+          </a:p>
+          <a:p>
+            <a:pPr marL="0" indent="0">
+              <a:spcBef>
+                <a:spcPts val="2424"/>
+              </a:spcBef>
+              <a:buNone/>
+            </a:pPr>
+            <a:r>
+              <a:rPr lang="en-US" sz="2000" dirty="0">
+                <a:effectLst>
+                  <a:glow rad="228600">
+                    <a:schemeClr val="accent4">
+                      <a:satMod val="175000"/>
+                      <a:alpha val="40000"/>
+                    </a:schemeClr>
+                  </a:glow>
+                </a:effectLst>
+              </a:rPr>
+              <a:t>3</a:t>
+            </a:r>
+            <a:r>
+              <a:rPr lang="en-US" sz="2000" dirty="0" smtClean="0">
+                <a:effectLst>
+                  <a:glow rad="228600">
+                    <a:schemeClr val="accent4">
+                      <a:satMod val="175000"/>
+                      <a:alpha val="40000"/>
+                    </a:schemeClr>
+                  </a:glow>
+                </a:effectLst>
+              </a:rPr>
+              <a:t>  </a:t>
+            </a:r>
+            <a:r>
+              <a:rPr lang="en-US" sz="2000" dirty="0" smtClean="0"/>
+              <a:t>Exit from the shell and find the container ID</a:t>
+            </a:r>
+          </a:p>
+          <a:p>
+            <a:pPr marL="0" indent="0">
+              <a:spcBef>
+                <a:spcPts val="1224"/>
+              </a:spcBef>
+              <a:buNone/>
+            </a:pPr>
+            <a:r>
+              <a:rPr lang="en-US" sz="2000" b="1" dirty="0" err="1" smtClean="0">
+                <a:latin typeface="Courier"/>
+                <a:cs typeface="Courier"/>
+              </a:rPr>
+              <a:t>docker</a:t>
+            </a:r>
+            <a:r>
+              <a:rPr lang="en-US" sz="2000" b="1" dirty="0" smtClean="0">
+                <a:latin typeface="Courier"/>
+                <a:cs typeface="Courier"/>
+              </a:rPr>
+              <a:t> </a:t>
+            </a:r>
+            <a:r>
+              <a:rPr lang="en-US" sz="2000" b="1" dirty="0" err="1" smtClean="0">
+                <a:latin typeface="Courier"/>
+                <a:cs typeface="Courier"/>
+              </a:rPr>
+              <a:t>ps</a:t>
+            </a:r>
+            <a:r>
+              <a:rPr lang="en-US" sz="2000" b="1" dirty="0" smtClean="0">
+                <a:latin typeface="Courier"/>
+                <a:cs typeface="Courier"/>
+              </a:rPr>
+              <a:t> –a</a:t>
+            </a:r>
+            <a:endParaRPr lang="en-US" sz="2000" dirty="0" smtClean="0"/>
+          </a:p>
+          <a:p>
+            <a:pPr marL="0" indent="0">
+              <a:spcBef>
+                <a:spcPts val="2424"/>
+              </a:spcBef>
+              <a:buNone/>
+            </a:pPr>
+            <a:r>
+              <a:rPr lang="en-US" sz="2000" dirty="0">
+                <a:effectLst>
+                  <a:glow rad="228600">
+                    <a:schemeClr val="accent4">
+                      <a:satMod val="175000"/>
+                      <a:alpha val="40000"/>
+                    </a:schemeClr>
+                  </a:glow>
+                </a:effectLst>
+              </a:rPr>
+              <a:t>4</a:t>
+            </a:r>
+            <a:r>
+              <a:rPr lang="en-US" sz="2000" dirty="0" smtClean="0">
+                <a:effectLst>
+                  <a:glow rad="228600">
+                    <a:schemeClr val="accent4">
+                      <a:satMod val="175000"/>
+                      <a:alpha val="40000"/>
+                    </a:schemeClr>
+                  </a:glow>
+                </a:effectLst>
+              </a:rPr>
+              <a:t>  </a:t>
+            </a:r>
+            <a:r>
+              <a:rPr lang="en-US" sz="2000" dirty="0" smtClean="0"/>
+              <a:t>Save the container as a new image</a:t>
+            </a:r>
+            <a:endParaRPr lang="en-US" sz="2000" dirty="0"/>
+          </a:p>
+          <a:p>
+            <a:pPr marL="0" indent="0">
+              <a:spcBef>
+                <a:spcPts val="1224"/>
+              </a:spcBef>
+              <a:buNone/>
+            </a:pPr>
+            <a:r>
+              <a:rPr lang="en-US" sz="2000" b="1" dirty="0" err="1" smtClean="0">
+                <a:latin typeface="Courier"/>
+                <a:cs typeface="Courier"/>
+              </a:rPr>
+              <a:t>d</a:t>
+            </a:r>
+            <a:r>
+              <a:rPr lang="en-US" sz="2000" b="1" dirty="0" err="1" smtClean="0">
+                <a:latin typeface="Courier"/>
+                <a:cs typeface="Courier"/>
+              </a:rPr>
+              <a:t>ocker</a:t>
+            </a:r>
+            <a:r>
+              <a:rPr lang="en-US" sz="2000" b="1" dirty="0" smtClean="0">
+                <a:latin typeface="Courier"/>
+                <a:cs typeface="Courier"/>
+              </a:rPr>
+              <a:t> commit </a:t>
+            </a:r>
+            <a:r>
+              <a:rPr lang="en-US" sz="2000" b="1" dirty="0" err="1" smtClean="0">
+                <a:latin typeface="Courier"/>
+                <a:cs typeface="Courier"/>
+              </a:rPr>
+              <a:t>cranky_feynmann</a:t>
+            </a:r>
+            <a:r>
+              <a:rPr lang="en-US" sz="2000" b="1" dirty="0" smtClean="0">
+                <a:latin typeface="Courier"/>
+                <a:cs typeface="Courier"/>
+              </a:rPr>
+              <a:t> </a:t>
+            </a:r>
+            <a:r>
+              <a:rPr lang="en-US" sz="2000" b="1" dirty="0" err="1" smtClean="0">
+                <a:latin typeface="Courier"/>
+                <a:cs typeface="Courier"/>
+              </a:rPr>
+              <a:t>myimage</a:t>
+            </a:r>
+            <a:endParaRPr lang="en-US" sz="2000" b="1" dirty="0">
+              <a:latin typeface="Courier"/>
+              <a:cs typeface="Courier"/>
+            </a:endParaRPr>
+          </a:p>
+          <a:p>
+            <a:pPr marL="0" indent="0">
+              <a:buNone/>
+            </a:pPr>
+            <a:endParaRPr lang="en-US" sz="2000" dirty="0" smtClean="0">
               <a:solidFill>
                 <a:schemeClr val="accent2"/>
               </a:solidFill>
             </a:endParaRPr>
           </a:p>
-        </p:txBody>
-      </p:sp>
-      <p:sp>
-        <p:nvSpPr>
-          <p:cNvPr id="6" name="TextBox 5"/>
-          <p:cNvSpPr txBox="1"/>
-          <p:nvPr/>
-        </p:nvSpPr>
-        <p:spPr>
-          <a:xfrm>
-            <a:off x="5325941" y="2295220"/>
-            <a:ext cx="1947130" cy="369332"/>
-          </a:xfrm>
-          <a:prstGeom prst="rect">
-            <a:avLst/>
-          </a:prstGeom>
-          <a:noFill/>
-        </p:spPr>
-        <p:txBody>
-          <a:bodyPr wrap="none" rtlCol="0">
-            <a:spAutoFit/>
-          </a:bodyPr>
-          <a:lstStyle/>
-          <a:p>
-            <a:r>
-              <a:rPr lang="en-US" b="1" dirty="0" err="1" smtClean="0">
-                <a:solidFill>
-                  <a:srgbClr val="24A8E6"/>
-                </a:solidFill>
-              </a:rPr>
+          <a:p>
+            <a:pPr>
+              <a:buFont typeface="Wingdings" charset="2"/>
+              <a:buChar char="Ø"/>
+            </a:pPr>
+            <a:r>
+              <a:rPr lang="en-US" sz="2400" dirty="0" smtClean="0"/>
+              <a:t>Builds can be automated using a </a:t>
+            </a:r>
+            <a:r>
+              <a:rPr lang="en-US" sz="2400" b="1" dirty="0" err="1" smtClean="0"/>
               <a:t>Docker</a:t>
             </a:r>
             <a:r>
-              <a:rPr lang="en-US" b="1" dirty="0" smtClean="0">
-                <a:solidFill>
-                  <a:srgbClr val="24A8E6"/>
-                </a:solidFill>
-              </a:rPr>
-              <a:t> Containers</a:t>
-            </a:r>
-            <a:endParaRPr lang="en-US" b="1" dirty="0">
-              <a:solidFill>
-                <a:srgbClr val="24A8E6"/>
-              </a:solidFill>
-            </a:endParaRPr>
-          </a:p>
-        </p:txBody>
-      </p:sp>
-      <p:sp>
-        <p:nvSpPr>
-          <p:cNvPr id="7" name="TextBox 6"/>
-          <p:cNvSpPr txBox="1"/>
-          <p:nvPr/>
-        </p:nvSpPr>
-        <p:spPr>
-          <a:xfrm>
-            <a:off x="745743" y="5196288"/>
-            <a:ext cx="3647107" cy="1077218"/>
-          </a:xfrm>
-          <a:prstGeom prst="rect">
-            <a:avLst/>
-          </a:prstGeom>
-          <a:noFill/>
-        </p:spPr>
-        <p:txBody>
-          <a:bodyPr wrap="square" rtlCol="0">
-            <a:spAutoFit/>
-          </a:bodyPr>
-          <a:lstStyle/>
-          <a:p>
-            <a:r>
-              <a:rPr lang="en-US" sz="1600" dirty="0" smtClean="0"/>
-              <a:t>e.g. </a:t>
-            </a:r>
-            <a:r>
-              <a:rPr lang="en-US" sz="1600" b="1" dirty="0" smtClean="0"/>
-              <a:t>VMware</a:t>
-            </a:r>
-            <a:r>
-              <a:rPr lang="en-US" sz="1600" dirty="0" smtClean="0"/>
-              <a:t>, </a:t>
-            </a:r>
-            <a:r>
-              <a:rPr lang="en-US" sz="1600" b="1" dirty="0" err="1" smtClean="0"/>
-              <a:t>VirtualBox</a:t>
-            </a:r>
-            <a:endParaRPr lang="en-US" sz="1600" b="1" dirty="0" smtClean="0"/>
-          </a:p>
-          <a:p>
-            <a:r>
-              <a:rPr lang="en-US" sz="1600" dirty="0" smtClean="0"/>
-              <a:t>Each virtual machine includes the entire guest OS – tens of GBs, can take minutes to start up</a:t>
-            </a:r>
-            <a:endParaRPr lang="en-US" sz="1600" dirty="0"/>
-          </a:p>
-        </p:txBody>
-      </p:sp>
-      <p:sp>
-        <p:nvSpPr>
-          <p:cNvPr id="8" name="TextBox 7"/>
-          <p:cNvSpPr txBox="1"/>
-          <p:nvPr/>
-        </p:nvSpPr>
-        <p:spPr>
-          <a:xfrm>
-            <a:off x="5252697" y="5196288"/>
-            <a:ext cx="3647107" cy="1077218"/>
-          </a:xfrm>
-          <a:prstGeom prst="rect">
-            <a:avLst/>
-          </a:prstGeom>
-          <a:noFill/>
-        </p:spPr>
-        <p:txBody>
-          <a:bodyPr wrap="square" rtlCol="0">
-            <a:spAutoFit/>
-          </a:bodyPr>
-          <a:lstStyle/>
-          <a:p>
-            <a:r>
-              <a:rPr lang="en-US" sz="1600" dirty="0" smtClean="0"/>
-              <a:t>Containers run as isolated processes on the host OS</a:t>
-            </a:r>
-          </a:p>
-          <a:p>
-            <a:r>
-              <a:rPr lang="en-US" sz="1600" dirty="0" smtClean="0"/>
-              <a:t>Lightweight, start instantly, use less memory</a:t>
-            </a:r>
-          </a:p>
-        </p:txBody>
-      </p:sp>
-      <p:sp>
-        <p:nvSpPr>
-          <p:cNvPr id="9" name="TextBox 8"/>
-          <p:cNvSpPr txBox="1"/>
-          <p:nvPr/>
-        </p:nvSpPr>
-        <p:spPr>
-          <a:xfrm>
-            <a:off x="2540155" y="6304284"/>
-            <a:ext cx="4236068" cy="369332"/>
-          </a:xfrm>
-          <a:prstGeom prst="rect">
-            <a:avLst/>
-          </a:prstGeom>
-          <a:noFill/>
-        </p:spPr>
-        <p:txBody>
-          <a:bodyPr wrap="none" rtlCol="0">
-            <a:spAutoFit/>
-          </a:bodyPr>
-          <a:lstStyle/>
-          <a:p>
-            <a:r>
-              <a:rPr lang="en-US" dirty="0" smtClean="0"/>
-              <a:t>Both offer resource isolation and allocation</a:t>
-            </a:r>
-            <a:endParaRPr lang="en-US" dirty="0"/>
+              <a:rPr lang="en-US" sz="2400" b="1" dirty="0" err="1" smtClean="0"/>
+              <a:t>file</a:t>
+            </a:r>
+            <a:endParaRPr lang="en-US" sz="2400" b="1" dirty="0"/>
           </a:p>
         </p:txBody>
       </p:sp>
     </p:spTree>
     <p:extLst>
       <p:ext uri="{BB962C8B-B14F-4D97-AF65-F5344CB8AC3E}">
-        <p14:creationId xmlns:p14="http://schemas.microsoft.com/office/powerpoint/2010/main" val="135324830"/>
+        <p14:creationId xmlns:p14="http://schemas.microsoft.com/office/powerpoint/2010/main" val="1800366692"/>
       </p:ext>
     </p:extLst>
   </p:cSld>
@@ -5251,7 +6068,79 @@
   <p:timing>
     <p:tnLst>
       <p:par>
-        <p:cTn xmlns:p14="http://schemas.microsoft.com/office/powerpoint/2010/main" id="1" dur="indefinite" restart="never" nodeType="tmRoot"/>
+        <p:cTn xmlns:p14="http://schemas.microsoft.com/office/powerpoint/2010/main" id="1" dur="indefinite" restart="never" nodeType="tmRoot">
+          <p:childTnLst>
+            <p:seq concurrent="1" nextAc="seek">
+              <p:cTn id="2" dur="indefinite" nodeType="mainSeq">
+                <p:childTnLst>
+                  <p:par>
+                    <p:cTn id="3" fill="hold">
+                      <p:stCondLst>
+                        <p:cond delay="indefinite"/>
+                      </p:stCondLst>
+                      <p:childTnLst>
+                        <p:par>
+                          <p:cTn id="4" fill="hold">
+                            <p:stCondLst>
+                              <p:cond delay="0"/>
+                            </p:stCondLst>
+                            <p:childTnLst>
+                              <p:par>
+                                <p:cTn id="5" presetID="1" presetClass="entr" presetSubtype="0" fill="hold" nodeType="clickEffect">
+                                  <p:stCondLst>
+                                    <p:cond delay="0"/>
+                                  </p:stCondLst>
+                                  <p:childTnLst>
+                                    <p:set>
+                                      <p:cBhvr>
+                                        <p:cTn id="6" dur="1" fill="hold">
+                                          <p:stCondLst>
+                                            <p:cond delay="0"/>
+                                          </p:stCondLst>
+                                        </p:cTn>
+                                        <p:tgtEl>
+                                          <p:spTgt spid="3">
+                                            <p:txEl>
+                                              <p:pRg st="8" end="8"/>
+                                            </p:txEl>
+                                          </p:spTgt>
+                                        </p:tgtEl>
+                                        <p:attrNameLst>
+                                          <p:attrName>style.visibility</p:attrName>
+                                        </p:attrNameLst>
+                                      </p:cBhvr>
+                                      <p:to>
+                                        <p:strVal val="visible"/>
+                                      </p:to>
+                                    </p:set>
+                                  </p:childTnLst>
+                                </p:cTn>
+                              </p:par>
+                            </p:childTnLst>
+                          </p:cTn>
+                        </p:par>
+                      </p:childTnLst>
+                    </p:cTn>
+                  </p:par>
+                </p:childTnLst>
+              </p:cTn>
+              <p:prevCondLst>
+                <p:cond evt="onPrev" delay="0">
+                  <p:tgtEl>
+                    <p:sldTgt/>
+                  </p:tgtEl>
+                </p:cond>
+              </p:prevCondLst>
+              <p:nextCondLst>
+                <p:cond evt="onNext" delay="0">
+                  <p:tgtEl>
+                    <p:sldTgt/>
+                  </p:tgtEl>
+                </p:cond>
+              </p:nextCondLst>
+            </p:seq>
+          </p:childTnLst>
+        </p:cTn>
       </p:par>
     </p:tnLst>
   </p:timing>
@@ -5291,16 +6180,8 @@
           <a:lstStyle/>
           <a:p>
             <a:r>
-              <a:rPr lang="en-US" dirty="0" smtClean="0"/>
-              <a:t>How have we used </a:t>
-            </a:r>
-            <a:r>
               <a:rPr lang="en-US" dirty="0" err="1" smtClean="0"/>
-              <a:t>Docker</a:t>
-            </a:r>
-            <a:r>
-              <a:rPr lang="en-US" dirty="0" smtClean="0"/>
-              <a:t>?</a:t>
+              <a:t>Dockerfile</a:t>
             </a:r>
             <a:endParaRPr lang="en-US" dirty="0"/>
           </a:p>
@@ -5308,86 +6189,487 @@
       </p:sp>
       <p:sp>
         <p:nvSpPr>
-          <p:cNvPr id="3" name="Content Placeholder 2"/>
-          <p:cNvSpPr>
-            <a:spLocks noGrp="1"/>
-          </p:cNvSpPr>
-          <p:nvPr>
-            <p:ph idx="1"/>
-          </p:nvPr>
-        </p:nvSpPr>
-        <p:spPr/>
-        <p:txBody>
-          <a:bodyPr>
-            <a:normAutofit lnSpcReduction="10000"/>
+          <p:cNvPr id="3" name="TextBox 2"/>
+          <p:cNvSpPr txBox="1"/>
+          <p:nvPr/>
+        </p:nvSpPr>
+        <p:spPr>
+          <a:xfrm>
+            <a:off x="280495" y="1293669"/>
+            <a:ext cx="8734796" cy="4524314"/>
+          </a:xfrm>
+          <a:prstGeom prst="rect">
+            <a:avLst/>
+          </a:prstGeom>
+          <a:noFill/>
+        </p:spPr>
+        <p:txBody>
+          <a:bodyPr wrap="square" rtlCol="0">
+            <a:spAutoFit/>
           </a:bodyPr>
           <a:lstStyle/>
           <a:p>
             <a:r>
-              <a:rPr lang="en-US" dirty="0" err="1" smtClean="0"/>
-              <a:t>MutSigCV</a:t>
-            </a:r>
-            <a:endParaRPr lang="en-US" dirty="0"/>
-          </a:p>
-          <a:p>
-            <a:endParaRPr lang="en-US" dirty="0" smtClean="0"/>
-          </a:p>
-          <a:p>
-            <a:r>
-              <a:rPr lang="en-US" dirty="0" smtClean="0"/>
-              <a:t>Shiny applications</a:t>
-            </a:r>
-          </a:p>
-          <a:p>
-            <a:pPr lvl="1"/>
-            <a:r>
-              <a:rPr lang="en-US" dirty="0" smtClean="0"/>
-              <a:t>Proteomics TMT analysis</a:t>
-            </a:r>
-          </a:p>
-          <a:p>
-            <a:pPr lvl="1"/>
-            <a:r>
-              <a:rPr lang="en-US" dirty="0" smtClean="0"/>
-              <a:t>Caldas drug sensitivity portal</a:t>
-            </a:r>
-          </a:p>
-          <a:p>
-            <a:endParaRPr lang="en-US" dirty="0"/>
-          </a:p>
-          <a:p>
-            <a:r>
-              <a:rPr lang="en-US" dirty="0" smtClean="0"/>
-              <a:t>Sanger Cancer Genome Project analysis pipeline</a:t>
-            </a:r>
-          </a:p>
-          <a:p>
-            <a:endParaRPr lang="en-US" dirty="0"/>
-          </a:p>
-          <a:p>
-            <a:r>
-              <a:rPr lang="en-US" dirty="0" smtClean="0"/>
-              <a:t>Training</a:t>
-            </a:r>
-          </a:p>
-          <a:p>
-            <a:pPr lvl="1"/>
-            <a:r>
-              <a:rPr lang="en-US" dirty="0" smtClean="0"/>
-              <a:t>CRUK Summer School on cancer </a:t>
-            </a:r>
-            <a:r>
-              <a:rPr lang="en-US" smtClean="0"/>
-              <a:t>genome analysis</a:t>
-            </a:r>
-            <a:endParaRPr lang="en-US" dirty="0" smtClean="0"/>
+              <a:rPr lang="en-US" sz="2000" b="1" dirty="0" smtClean="0">
+                <a:solidFill>
+                  <a:srgbClr val="211F70"/>
+                </a:solidFill>
+                <a:cs typeface="Courier"/>
+              </a:rPr>
+              <a:t>Shiny server</a:t>
+            </a:r>
+          </a:p>
+          <a:p>
+            <a:endParaRPr lang="en-US" sz="1200" dirty="0" smtClean="0">
+              <a:latin typeface="Courier"/>
+              <a:cs typeface="Courier"/>
+            </a:endParaRPr>
+          </a:p>
+          <a:p>
+            <a:endParaRPr lang="en-US" sz="1200" dirty="0">
+              <a:latin typeface="Courier"/>
+              <a:cs typeface="Courier"/>
+            </a:endParaRPr>
+          </a:p>
+          <a:p>
+            <a:r>
+              <a:rPr lang="en-US" sz="1200" b="1" dirty="0" smtClean="0">
+                <a:latin typeface="Courier"/>
+                <a:cs typeface="Courier"/>
+              </a:rPr>
+              <a:t>FROM</a:t>
+            </a:r>
+            <a:r>
+              <a:rPr lang="en-US" sz="1200" dirty="0" smtClean="0">
+                <a:latin typeface="Courier"/>
+                <a:cs typeface="Courier"/>
+              </a:rPr>
+              <a:t> </a:t>
+            </a:r>
+            <a:r>
+              <a:rPr lang="en-US" sz="1200" dirty="0">
+                <a:latin typeface="Courier"/>
+                <a:cs typeface="Courier"/>
+              </a:rPr>
+              <a:t>centos:7</a:t>
+            </a:r>
+          </a:p>
+          <a:p>
+            <a:endParaRPr lang="en-US" sz="1200" dirty="0">
+              <a:latin typeface="Courier"/>
+              <a:cs typeface="Courier"/>
+            </a:endParaRPr>
+          </a:p>
+          <a:p>
+            <a:r>
+              <a:rPr lang="en-US" sz="1200" b="1" dirty="0">
+                <a:latin typeface="Courier"/>
+                <a:cs typeface="Courier"/>
+              </a:rPr>
+              <a:t>RUN</a:t>
+            </a:r>
+            <a:r>
+              <a:rPr lang="en-US" sz="1200" dirty="0">
+                <a:latin typeface="Courier"/>
+                <a:cs typeface="Courier"/>
+              </a:rPr>
+              <a:t> yum </a:t>
+            </a:r>
+            <a:r>
+              <a:rPr lang="en-US" sz="1200" dirty="0" err="1">
+                <a:latin typeface="Courier"/>
+                <a:cs typeface="Courier"/>
+              </a:rPr>
+              <a:t>groupinstall</a:t>
+            </a:r>
+            <a:r>
+              <a:rPr lang="en-US" sz="1200" dirty="0">
+                <a:latin typeface="Courier"/>
+                <a:cs typeface="Courier"/>
+              </a:rPr>
+              <a:t> -y 'development tools'</a:t>
+            </a:r>
+          </a:p>
+          <a:p>
+            <a:r>
+              <a:rPr lang="en-US" sz="1200" b="1" dirty="0">
+                <a:latin typeface="Courier"/>
+                <a:cs typeface="Courier"/>
+              </a:rPr>
+              <a:t>RUN</a:t>
+            </a:r>
+            <a:r>
+              <a:rPr lang="en-US" sz="1200" dirty="0">
+                <a:latin typeface="Courier"/>
+                <a:cs typeface="Courier"/>
+              </a:rPr>
+              <a:t> yum install -y </a:t>
+            </a:r>
+            <a:r>
+              <a:rPr lang="en-US" sz="1200" dirty="0" err="1" smtClean="0">
+                <a:latin typeface="Courier"/>
+                <a:cs typeface="Courier"/>
+              </a:rPr>
+              <a:t>wget</a:t>
+            </a:r>
+            <a:endParaRPr lang="en-US" sz="1200" dirty="0" smtClean="0">
+              <a:latin typeface="Courier"/>
+              <a:cs typeface="Courier"/>
+            </a:endParaRPr>
+          </a:p>
+          <a:p>
+            <a:endParaRPr lang="en-US" sz="1200" dirty="0">
+              <a:latin typeface="Courier"/>
+              <a:cs typeface="Courier"/>
+            </a:endParaRPr>
+          </a:p>
+          <a:p>
+            <a:r>
+              <a:rPr lang="en-US" sz="1200" b="1" dirty="0">
+                <a:latin typeface="Courier"/>
+                <a:cs typeface="Courier"/>
+              </a:rPr>
+              <a:t>RUN</a:t>
+            </a:r>
+            <a:r>
+              <a:rPr lang="en-US" sz="1200" dirty="0">
+                <a:latin typeface="Courier"/>
+                <a:cs typeface="Courier"/>
+              </a:rPr>
+              <a:t> rpm -</a:t>
+            </a:r>
+            <a:r>
+              <a:rPr lang="en-US" sz="1200" dirty="0" err="1">
+                <a:latin typeface="Courier"/>
+                <a:cs typeface="Courier"/>
+              </a:rPr>
+              <a:t>Uvh</a:t>
+            </a:r>
+            <a:r>
+              <a:rPr lang="en-US" sz="1200" dirty="0">
+                <a:latin typeface="Courier"/>
+                <a:cs typeface="Courier"/>
+              </a:rPr>
+              <a:t> https://</a:t>
+            </a:r>
+            <a:r>
+              <a:rPr lang="en-US" sz="1200" dirty="0" err="1">
+                <a:latin typeface="Courier"/>
+                <a:cs typeface="Courier"/>
+              </a:rPr>
+              <a:t>dl.fedoraproject.org</a:t>
+            </a:r>
+            <a:r>
+              <a:rPr lang="en-US" sz="1200" dirty="0">
+                <a:latin typeface="Courier"/>
+                <a:cs typeface="Courier"/>
+              </a:rPr>
+              <a:t>/pub/</a:t>
+            </a:r>
+            <a:r>
+              <a:rPr lang="en-US" sz="1200" dirty="0" err="1">
+                <a:latin typeface="Courier"/>
+                <a:cs typeface="Courier"/>
+              </a:rPr>
+              <a:t>epel</a:t>
+            </a:r>
+            <a:r>
+              <a:rPr lang="en-US" sz="1200" dirty="0">
+                <a:latin typeface="Courier"/>
+                <a:cs typeface="Courier"/>
+              </a:rPr>
+              <a:t>/epel-release-latest-7.noarch.rpm</a:t>
+            </a:r>
+          </a:p>
+          <a:p>
+            <a:r>
+              <a:rPr lang="en-US" sz="1200" b="1" dirty="0">
+                <a:latin typeface="Courier"/>
+                <a:cs typeface="Courier"/>
+              </a:rPr>
+              <a:t>RUN</a:t>
+            </a:r>
+            <a:r>
+              <a:rPr lang="en-US" sz="1200" dirty="0">
+                <a:latin typeface="Courier"/>
+                <a:cs typeface="Courier"/>
+              </a:rPr>
+              <a:t> yum install -y R</a:t>
+            </a:r>
+          </a:p>
+          <a:p>
+            <a:endParaRPr lang="en-US" sz="1200" dirty="0">
+              <a:latin typeface="Courier"/>
+              <a:cs typeface="Courier"/>
+            </a:endParaRPr>
+          </a:p>
+          <a:p>
+            <a:r>
+              <a:rPr lang="en-US" sz="1200" b="1" dirty="0">
+                <a:latin typeface="Courier"/>
+                <a:cs typeface="Courier"/>
+              </a:rPr>
+              <a:t>RUN</a:t>
+            </a:r>
+            <a:r>
+              <a:rPr lang="en-US" sz="1200" dirty="0">
+                <a:latin typeface="Courier"/>
+                <a:cs typeface="Courier"/>
+              </a:rPr>
+              <a:t> R -e "</a:t>
+            </a:r>
+            <a:r>
+              <a:rPr lang="en-US" sz="1200" dirty="0" err="1">
+                <a:latin typeface="Courier"/>
+                <a:cs typeface="Courier"/>
+              </a:rPr>
+              <a:t>install.packages</a:t>
+            </a:r>
+            <a:r>
+              <a:rPr lang="en-US" sz="1200" dirty="0">
+                <a:latin typeface="Courier"/>
+                <a:cs typeface="Courier"/>
+              </a:rPr>
+              <a:t>(c('shiny', '</a:t>
+            </a:r>
+            <a:r>
+              <a:rPr lang="en-US" sz="1200" dirty="0" err="1">
+                <a:latin typeface="Courier"/>
+                <a:cs typeface="Courier"/>
+              </a:rPr>
+              <a:t>rmarkdown</a:t>
+            </a:r>
+            <a:r>
+              <a:rPr lang="en-US" sz="1200" dirty="0">
+                <a:latin typeface="Courier"/>
+                <a:cs typeface="Courier"/>
+              </a:rPr>
+              <a:t>'), repos='https://</a:t>
+            </a:r>
+            <a:r>
+              <a:rPr lang="en-US" sz="1200" dirty="0" err="1">
+                <a:latin typeface="Courier"/>
+                <a:cs typeface="Courier"/>
+              </a:rPr>
+              <a:t>cran.rstudio.com</a:t>
+            </a:r>
+            <a:r>
+              <a:rPr lang="en-US" sz="1200" dirty="0">
+                <a:latin typeface="Courier"/>
+                <a:cs typeface="Courier"/>
+              </a:rPr>
+              <a:t>')"</a:t>
+            </a:r>
+          </a:p>
+          <a:p>
+            <a:r>
+              <a:rPr lang="en-US" sz="1200" b="1" dirty="0">
+                <a:latin typeface="Courier"/>
+                <a:cs typeface="Courier"/>
+              </a:rPr>
+              <a:t>RUN</a:t>
+            </a:r>
+            <a:r>
+              <a:rPr lang="en-US" sz="1200" dirty="0">
+                <a:latin typeface="Courier"/>
+                <a:cs typeface="Courier"/>
+              </a:rPr>
+              <a:t> R -e "</a:t>
+            </a:r>
+            <a:r>
+              <a:rPr lang="en-US" sz="1200" dirty="0" err="1">
+                <a:latin typeface="Courier"/>
+                <a:cs typeface="Courier"/>
+              </a:rPr>
+              <a:t>install.packages</a:t>
+            </a:r>
+            <a:r>
+              <a:rPr lang="en-US" sz="1200" dirty="0">
+                <a:latin typeface="Courier"/>
+                <a:cs typeface="Courier"/>
+              </a:rPr>
+              <a:t>('</a:t>
+            </a:r>
+            <a:r>
+              <a:rPr lang="en-US" sz="1200" dirty="0" err="1">
+                <a:latin typeface="Courier"/>
+                <a:cs typeface="Courier"/>
+              </a:rPr>
+              <a:t>devtools</a:t>
+            </a:r>
+            <a:r>
+              <a:rPr lang="en-US" sz="1200" dirty="0">
+                <a:latin typeface="Courier"/>
+                <a:cs typeface="Courier"/>
+              </a:rPr>
+              <a:t>', repos='http://</a:t>
+            </a:r>
+            <a:r>
+              <a:rPr lang="en-US" sz="1200" dirty="0" err="1">
+                <a:latin typeface="Courier"/>
+                <a:cs typeface="Courier"/>
+              </a:rPr>
+              <a:t>mirrors.ebi.ac.uk</a:t>
+            </a:r>
+            <a:r>
+              <a:rPr lang="en-US" sz="1200" dirty="0">
+                <a:latin typeface="Courier"/>
+                <a:cs typeface="Courier"/>
+              </a:rPr>
+              <a:t>/CRAN')"</a:t>
+            </a:r>
+          </a:p>
+          <a:p>
+            <a:endParaRPr lang="en-US" sz="1200" dirty="0">
+              <a:latin typeface="Courier"/>
+              <a:cs typeface="Courier"/>
+            </a:endParaRPr>
+          </a:p>
+          <a:p>
+            <a:r>
+              <a:rPr lang="en-US" sz="1200" b="1" dirty="0">
+                <a:latin typeface="Courier"/>
+                <a:cs typeface="Courier"/>
+              </a:rPr>
+              <a:t>RUN</a:t>
+            </a:r>
+            <a:r>
+              <a:rPr lang="en-US" sz="1200" dirty="0">
+                <a:latin typeface="Courier"/>
+                <a:cs typeface="Courier"/>
+              </a:rPr>
+              <a:t> </a:t>
+            </a:r>
+            <a:r>
+              <a:rPr lang="en-US" sz="1200" dirty="0" err="1">
+                <a:latin typeface="Courier"/>
+                <a:cs typeface="Courier"/>
+              </a:rPr>
+              <a:t>wget</a:t>
+            </a:r>
+            <a:r>
+              <a:rPr lang="en-US" sz="1200" dirty="0">
+                <a:latin typeface="Courier"/>
+                <a:cs typeface="Courier"/>
+              </a:rPr>
+              <a:t> https://download3.rstudio.org/centos6.3/x86_64/shiny-server-1.5.0.730-rh6-x86_64.rpm</a:t>
+            </a:r>
+          </a:p>
+          <a:p>
+            <a:r>
+              <a:rPr lang="en-US" sz="1200" b="1" dirty="0">
+                <a:latin typeface="Courier"/>
+                <a:cs typeface="Courier"/>
+              </a:rPr>
+              <a:t>RUN</a:t>
+            </a:r>
+            <a:r>
+              <a:rPr lang="en-US" sz="1200" dirty="0">
+                <a:latin typeface="Courier"/>
+                <a:cs typeface="Courier"/>
+              </a:rPr>
+              <a:t> yum install -y --</a:t>
+            </a:r>
+            <a:r>
+              <a:rPr lang="en-US" sz="1200" dirty="0" err="1">
+                <a:latin typeface="Courier"/>
+                <a:cs typeface="Courier"/>
+              </a:rPr>
+              <a:t>nogpgcheck</a:t>
+            </a:r>
+            <a:r>
+              <a:rPr lang="en-US" sz="1200" dirty="0">
+                <a:latin typeface="Courier"/>
+                <a:cs typeface="Courier"/>
+              </a:rPr>
+              <a:t> shiny-server-1.5.0.730-rh6-x86_64.rpm</a:t>
+            </a:r>
+          </a:p>
+          <a:p>
+            <a:endParaRPr lang="en-US" sz="1200" dirty="0">
+              <a:latin typeface="Courier"/>
+              <a:cs typeface="Courier"/>
+            </a:endParaRPr>
+          </a:p>
+          <a:p>
+            <a:r>
+              <a:rPr lang="sk-SK" sz="1200" b="1" dirty="0">
+                <a:latin typeface="Courier"/>
+                <a:cs typeface="Courier"/>
+              </a:rPr>
+              <a:t>EXPOSE</a:t>
+            </a:r>
+            <a:r>
+              <a:rPr lang="sk-SK" sz="1200" dirty="0">
+                <a:latin typeface="Courier"/>
+                <a:cs typeface="Courier"/>
+              </a:rPr>
+              <a:t> 3838</a:t>
+            </a:r>
+          </a:p>
+          <a:p>
+            <a:endParaRPr lang="sk-SK" sz="1200" dirty="0">
+              <a:latin typeface="Courier"/>
+              <a:cs typeface="Courier"/>
+            </a:endParaRPr>
+          </a:p>
+          <a:p>
+            <a:r>
+              <a:rPr lang="sk-SK" sz="1200" b="1" dirty="0">
+                <a:latin typeface="Courier"/>
+                <a:cs typeface="Courier"/>
+              </a:rPr>
+              <a:t>COPY</a:t>
+            </a:r>
+            <a:r>
+              <a:rPr lang="sk-SK" sz="1200" dirty="0">
+                <a:latin typeface="Courier"/>
+                <a:cs typeface="Courier"/>
+              </a:rPr>
+              <a:t> shiny-server.sh /usr/bin/shiny-server.sh</a:t>
+            </a:r>
+          </a:p>
+          <a:p>
+            <a:endParaRPr lang="sk-SK" sz="1200" dirty="0">
+              <a:latin typeface="Courier"/>
+              <a:cs typeface="Courier"/>
+            </a:endParaRPr>
+          </a:p>
+          <a:p>
+            <a:r>
+              <a:rPr lang="sk-SK" sz="1200" b="1" dirty="0">
+                <a:latin typeface="Courier"/>
+                <a:cs typeface="Courier"/>
+              </a:rPr>
+              <a:t>CMD</a:t>
+            </a:r>
+            <a:r>
+              <a:rPr lang="sk-SK" sz="1200" dirty="0">
+                <a:latin typeface="Courier"/>
+                <a:cs typeface="Courier"/>
+              </a:rPr>
+              <a:t> ["/usr/bin/shiny-</a:t>
+            </a:r>
+            <a:r>
+              <a:rPr lang="sk-SK" sz="1200" dirty="0" smtClean="0">
+                <a:latin typeface="Courier"/>
+                <a:cs typeface="Courier"/>
+              </a:rPr>
+              <a:t>server.sh"]</a:t>
+            </a:r>
+          </a:p>
+          <a:p>
+            <a:endParaRPr lang="en-US" sz="1200" dirty="0">
+              <a:latin typeface="Courier"/>
+              <a:cs typeface="Courier"/>
+            </a:endParaRPr>
           </a:p>
         </p:txBody>
       </p:sp>
     </p:spTree>
     <p:extLst>
       <p:ext uri="{BB962C8B-B14F-4D97-AF65-F5344CB8AC3E}">
-        <p14:creationId xmlns:p14="http://schemas.microsoft.com/office/powerpoint/2010/main" val="4116138690"/>
+        <p14:creationId xmlns:p14="http://schemas.microsoft.com/office/powerpoint/2010/main" val="426652869"/>
       </p:ext>
     </p:extLst>
   </p:cSld>
@@ -5437,126 +6719,188 @@
           <a:lstStyle/>
           <a:p>
             <a:r>
+              <a:rPr lang="en-US" dirty="0" err="1" smtClean="0"/>
+              <a:t>Docker</a:t>
+            </a:r>
+            <a:r>
               <a:rPr lang="en-US" dirty="0" smtClean="0"/>
-              <a:t>Limitations</a:t>
+              <a:t> </a:t>
+            </a:r>
+            <a:r>
+              <a:rPr lang="en-US" dirty="0" err="1" smtClean="0"/>
+              <a:t>vs</a:t>
+            </a:r>
+            <a:r>
+              <a:rPr lang="en-US" dirty="0" smtClean="0"/>
+              <a:t> Virtual Machines</a:t>
             </a:r>
             <a:endParaRPr lang="en-US" dirty="0"/>
           </a:p>
         </p:txBody>
       </p:sp>
-      <p:sp>
-        <p:nvSpPr>
-          <p:cNvPr id="3" name="Content Placeholder 2"/>
-          <p:cNvSpPr>
-            <a:spLocks noGrp="1"/>
-          </p:cNvSpPr>
-          <p:nvPr>
-            <p:ph idx="1"/>
-          </p:nvPr>
-        </p:nvSpPr>
-        <p:spPr/>
-        <p:txBody>
-          <a:bodyPr>
-            <a:normAutofit/>
+      <p:pic>
+        <p:nvPicPr>
+          <p:cNvPr id="3" name="Picture 2"/>
+          <p:cNvPicPr>
+            <a:picLocks noChangeAspect="1"/>
+          </p:cNvPicPr>
+          <p:nvPr/>
+        </p:nvPicPr>
+        <p:blipFill>
+          <a:blip r:embed="rId2"/>
+          <a:stretch>
+            <a:fillRect/>
+          </a:stretch>
+        </p:blipFill>
+        <p:spPr>
+          <a:xfrm>
+            <a:off x="393700" y="1471217"/>
+            <a:ext cx="4067697" cy="3114903"/>
+          </a:xfrm>
+          <a:prstGeom prst="rect">
+            <a:avLst/>
+          </a:prstGeom>
+        </p:spPr>
+      </p:pic>
+      <p:pic>
+        <p:nvPicPr>
+          <p:cNvPr id="4" name="Picture 3"/>
+          <p:cNvPicPr>
+            <a:picLocks noChangeAspect="1"/>
+          </p:cNvPicPr>
+          <p:nvPr/>
+        </p:nvPicPr>
+        <p:blipFill>
+          <a:blip r:embed="rId3"/>
+          <a:stretch>
+            <a:fillRect/>
+          </a:stretch>
+        </p:blipFill>
+        <p:spPr>
+          <a:xfrm>
+            <a:off x="4751837" y="1470934"/>
+            <a:ext cx="4065477" cy="3113203"/>
+          </a:xfrm>
+          <a:prstGeom prst="rect">
+            <a:avLst/>
+          </a:prstGeom>
+        </p:spPr>
+      </p:pic>
+      <p:sp>
+        <p:nvSpPr>
+          <p:cNvPr id="5" name="TextBox 4"/>
+          <p:cNvSpPr txBox="1"/>
+          <p:nvPr/>
+        </p:nvSpPr>
+        <p:spPr>
+          <a:xfrm>
+            <a:off x="393700" y="4777188"/>
+            <a:ext cx="4067697" cy="907941"/>
+          </a:xfrm>
+          <a:prstGeom prst="rect">
+            <a:avLst/>
+          </a:prstGeom>
+          <a:noFill/>
+        </p:spPr>
+        <p:txBody>
+          <a:bodyPr wrap="square" rtlCol="0">
+            <a:spAutoFit/>
           </a:bodyPr>
           <a:lstStyle/>
           <a:p>
             <a:r>
-              <a:rPr lang="en-US" sz="2400" dirty="0" smtClean="0"/>
-              <a:t>Linux only containers although Microsoft getting in on the act with Windows Server 2016</a:t>
-            </a:r>
-          </a:p>
-          <a:p>
-            <a:endParaRPr lang="en-US" sz="2400" dirty="0" smtClean="0"/>
-          </a:p>
-          <a:p>
-            <a:r>
-              <a:rPr lang="en-US" sz="2400" dirty="0" smtClean="0"/>
-              <a:t>Additional layer of complexity</a:t>
-            </a:r>
-          </a:p>
-          <a:p>
-            <a:endParaRPr lang="en-US" sz="2400" dirty="0"/>
-          </a:p>
-          <a:p>
-            <a:r>
-              <a:rPr lang="en-US" sz="2400" dirty="0" smtClean="0"/>
-              <a:t>Need to run as root or expose elevated privileges of </a:t>
-            </a:r>
-            <a:r>
-              <a:rPr lang="en-US" sz="2400" dirty="0" err="1" smtClean="0"/>
-              <a:t>docker</a:t>
-            </a:r>
-            <a:r>
-              <a:rPr lang="en-US" sz="2400" dirty="0" smtClean="0"/>
-              <a:t> daemon (running as root) to users in the </a:t>
-            </a:r>
-            <a:r>
-              <a:rPr lang="en-US" sz="2400" dirty="0" err="1" smtClean="0"/>
-              <a:t>docker</a:t>
-            </a:r>
-            <a:r>
-              <a:rPr lang="en-US" sz="2400" dirty="0" smtClean="0"/>
-              <a:t> group</a:t>
-            </a:r>
-          </a:p>
-          <a:p>
-            <a:endParaRPr lang="en-US" sz="2400" dirty="0"/>
-          </a:p>
-          <a:p>
-            <a:r>
-              <a:rPr lang="en-US" sz="2400" b="1" i="1" dirty="0" smtClean="0">
-                <a:solidFill>
-                  <a:schemeClr val="accent2"/>
-                </a:solidFill>
-              </a:rPr>
-              <a:t>Can’t </a:t>
-            </a:r>
-            <a:r>
-              <a:rPr lang="en-US" sz="2400" i="1" dirty="0" smtClean="0">
-                <a:solidFill>
-                  <a:schemeClr val="accent2"/>
-                </a:solidFill>
-              </a:rPr>
-              <a:t>run </a:t>
-            </a:r>
-            <a:r>
-              <a:rPr lang="en-US" sz="2400" i="1" dirty="0" err="1" smtClean="0">
-                <a:solidFill>
-                  <a:schemeClr val="accent2"/>
-                </a:solidFill>
-              </a:rPr>
-              <a:t>docker</a:t>
-            </a:r>
-            <a:r>
-              <a:rPr lang="en-US" sz="2400" i="1" dirty="0" smtClean="0">
-                <a:solidFill>
-                  <a:schemeClr val="accent2"/>
-                </a:solidFill>
-              </a:rPr>
-              <a:t> applications on the CRUK-CI clusters </a:t>
-            </a:r>
-            <a:r>
-              <a:rPr lang="en-US" sz="2400" b="1" i="1" dirty="0" smtClean="0">
-                <a:solidFill>
-                  <a:schemeClr val="accent2"/>
-                </a:solidFill>
-                <a:sym typeface="Wingdings"/>
-              </a:rPr>
-              <a:t></a:t>
-            </a:r>
-            <a:endParaRPr lang="en-US" sz="2400" b="1" i="1" dirty="0">
-              <a:solidFill>
-                <a:schemeClr val="accent2"/>
-              </a:solidFill>
-            </a:endParaRPr>
+              <a:rPr lang="en-US" sz="1600" b="1" dirty="0" smtClean="0"/>
+              <a:t>Virtual Machines</a:t>
+            </a:r>
+            <a:r>
+              <a:rPr lang="en-US" sz="1600" i="1" dirty="0" smtClean="0"/>
+              <a:t> (VMware</a:t>
+            </a:r>
+            <a:r>
+              <a:rPr lang="en-US" sz="1600" i="1" dirty="0" smtClean="0"/>
+              <a:t>, </a:t>
+            </a:r>
+            <a:r>
+              <a:rPr lang="en-US" sz="1600" i="1" dirty="0" err="1" smtClean="0"/>
+              <a:t>VirtualBox</a:t>
+            </a:r>
+            <a:r>
+              <a:rPr lang="en-US" sz="1600" i="1" dirty="0" smtClean="0"/>
+              <a:t>)</a:t>
+            </a:r>
+            <a:endParaRPr lang="en-US" sz="1600" i="1" dirty="0" smtClean="0"/>
+          </a:p>
+          <a:p>
+            <a:pPr>
+              <a:spcBef>
+                <a:spcPts val="600"/>
+              </a:spcBef>
+            </a:pPr>
+            <a:r>
+              <a:rPr lang="en-US" sz="1600" dirty="0" smtClean="0"/>
+              <a:t>Each virtual machine includes the entire guest OS – tens of GBs, can take minutes to start up</a:t>
+            </a:r>
+            <a:endParaRPr lang="en-US" sz="1600" dirty="0"/>
+          </a:p>
+        </p:txBody>
+      </p:sp>
+      <p:sp>
+        <p:nvSpPr>
+          <p:cNvPr id="6" name="TextBox 5"/>
+          <p:cNvSpPr txBox="1"/>
+          <p:nvPr/>
+        </p:nvSpPr>
+        <p:spPr>
+          <a:xfrm>
+            <a:off x="4751838" y="4777188"/>
+            <a:ext cx="4065476" cy="1154162"/>
+          </a:xfrm>
+          <a:prstGeom prst="rect">
+            <a:avLst/>
+          </a:prstGeom>
+          <a:noFill/>
+        </p:spPr>
+        <p:txBody>
+          <a:bodyPr wrap="square" rtlCol="0">
+            <a:spAutoFit/>
+          </a:bodyPr>
+          <a:lstStyle/>
+          <a:p>
+            <a:r>
+              <a:rPr lang="en-US" sz="1600" b="1" dirty="0" err="1" smtClean="0"/>
+              <a:t>Docker</a:t>
+            </a:r>
+            <a:endParaRPr lang="en-US" sz="1600" b="1" dirty="0" smtClean="0"/>
+          </a:p>
+          <a:p>
+            <a:pPr>
+              <a:spcBef>
+                <a:spcPts val="600"/>
+              </a:spcBef>
+            </a:pPr>
+            <a:r>
+              <a:rPr lang="en-US" sz="1600" dirty="0" smtClean="0"/>
+              <a:t>Containers </a:t>
+            </a:r>
+            <a:r>
+              <a:rPr lang="en-US" sz="1600" dirty="0" smtClean="0"/>
+              <a:t>run as isolated processes on the host </a:t>
+            </a:r>
+            <a:r>
+              <a:rPr lang="en-US" sz="1600" dirty="0" smtClean="0"/>
+              <a:t>OS – lightweight, start </a:t>
+            </a:r>
+            <a:r>
+              <a:rPr lang="en-US" sz="1600" dirty="0" smtClean="0"/>
+              <a:t>instantly, use less memory</a:t>
+            </a:r>
           </a:p>
         </p:txBody>
       </p:sp>
     </p:spTree>
     <p:extLst>
       <p:ext uri="{BB962C8B-B14F-4D97-AF65-F5344CB8AC3E}">
-        <p14:creationId xmlns:p14="http://schemas.microsoft.com/office/powerpoint/2010/main" val="3876767902"/>
+        <p14:creationId xmlns:p14="http://schemas.microsoft.com/office/powerpoint/2010/main" val="1841821612"/>
       </p:ext>
     </p:extLst>
   </p:cSld>
@@ -5607,15 +6951,7 @@
           <a:p>
             <a:r>
               <a:rPr lang="en-US" dirty="0" smtClean="0"/>
-              <a:t>So how can </a:t>
-            </a:r>
-            <a:r>
-              <a:rPr lang="en-US" dirty="0" err="1" smtClean="0"/>
-              <a:t>Docker</a:t>
-            </a:r>
-            <a:r>
-              <a:rPr lang="en-US" dirty="0" smtClean="0"/>
-              <a:t> help me?</a:t>
+              <a:t>Security issues</a:t>
             </a:r>
             <a:endParaRPr lang="en-US" dirty="0"/>
           </a:p>
@@ -5638,94 +6974,145 @@
           </a:bodyPr>
           <a:lstStyle/>
           <a:p>
-            <a:r>
-              <a:rPr lang="en-US" sz="2400" dirty="0" err="1" smtClean="0"/>
-              <a:t>Trialling</a:t>
-            </a:r>
+            <a:pPr>
+              <a:spcBef>
+                <a:spcPts val="2424"/>
+              </a:spcBef>
+            </a:pPr>
             <a:r>
               <a:rPr lang="en-US" sz="2400" dirty="0" smtClean="0"/>
-              <a:t> new software</a:t>
-            </a:r>
-          </a:p>
-          <a:p>
-            <a:pPr lvl="1"/>
+              <a:t>Elevated privileges</a:t>
+            </a:r>
+          </a:p>
+          <a:p>
+            <a:pPr lvl="1">
+              <a:spcBef>
+                <a:spcPts val="624"/>
+              </a:spcBef>
+            </a:pPr>
+            <a:r>
+              <a:rPr lang="en-US" sz="2000" dirty="0" err="1" smtClean="0"/>
+              <a:t>Docker</a:t>
+            </a:r>
+            <a:r>
+              <a:rPr lang="en-US" sz="2000" dirty="0" smtClean="0"/>
+              <a:t> daemon requires root privileges on </a:t>
+            </a:r>
+            <a:r>
+              <a:rPr lang="en-US" sz="2000" dirty="0" err="1" smtClean="0"/>
+              <a:t>linux</a:t>
+            </a:r>
+            <a:endParaRPr lang="en-US" sz="2000" dirty="0"/>
+          </a:p>
+          <a:p>
+            <a:pPr lvl="1">
+              <a:spcBef>
+                <a:spcPts val="624"/>
+              </a:spcBef>
+            </a:pPr>
+            <a:r>
+              <a:rPr lang="en-US" sz="2000" dirty="0" smtClean="0"/>
+              <a:t>Allows containers to have root access to the host </a:t>
+            </a:r>
+            <a:r>
+              <a:rPr lang="en-US" sz="2000" dirty="0" err="1" smtClean="0"/>
+              <a:t>filesystem</a:t>
+            </a:r>
+            <a:endParaRPr lang="en-US" sz="2000" dirty="0" smtClean="0"/>
+          </a:p>
+          <a:p>
+            <a:pPr>
+              <a:spcBef>
+                <a:spcPts val="2424"/>
+              </a:spcBef>
+            </a:pPr>
+            <a:r>
+              <a:rPr lang="en-US" sz="2400" dirty="0" smtClean="0"/>
+              <a:t>Weaker isolation than VMs</a:t>
+            </a:r>
+          </a:p>
+          <a:p>
+            <a:pPr lvl="1">
+              <a:spcBef>
+                <a:spcPts val="624"/>
+              </a:spcBef>
+            </a:pPr>
             <a:r>
               <a:rPr lang="en-US" sz="2000" dirty="0"/>
-              <a:t>Clean, unpolluted starting point</a:t>
-            </a:r>
-          </a:p>
-          <a:p>
-            <a:pPr lvl="1"/>
+              <a:t>A</a:t>
+            </a:r>
             <a:r>
               <a:rPr lang="en-US" sz="2000" dirty="0" smtClean="0"/>
-              <a:t>Isolated environment – won’t affect other applications</a:t>
-            </a:r>
-          </a:p>
-          <a:p>
-            <a:pPr lvl="1"/>
-            <a:r>
-              <a:rPr lang="en-US" sz="2000" dirty="0" err="1" smtClean="0"/>
-              <a:t>Superuser</a:t>
-            </a:r>
-            <a:r>
-              <a:rPr lang="en-US" sz="2000" dirty="0" smtClean="0"/>
-              <a:t> privileges and complete control over what you install</a:t>
-            </a:r>
-          </a:p>
-          <a:p>
-            <a:endParaRPr lang="en-US" sz="2400" dirty="0" smtClean="0"/>
-          </a:p>
-          <a:p>
-            <a:r>
-              <a:rPr lang="en-US" sz="2400" dirty="0" smtClean="0"/>
-              <a:t>Bioinformatics developers increasingly using </a:t>
-            </a:r>
-            <a:r>
-              <a:rPr lang="en-US" sz="2400" dirty="0" err="1" smtClean="0"/>
-              <a:t>docker</a:t>
-            </a:r>
-            <a:r>
-              <a:rPr lang="en-US" sz="2400" dirty="0" smtClean="0"/>
-              <a:t> to package and distribute applications</a:t>
-            </a:r>
-          </a:p>
-          <a:p>
-            <a:pPr lvl="1"/>
-            <a:r>
-              <a:rPr lang="en-US" sz="2000" dirty="0" smtClean="0"/>
-              <a:t>Much simpler installation route</a:t>
-            </a:r>
-          </a:p>
-          <a:p>
-            <a:endParaRPr lang="en-US" sz="2400" dirty="0" smtClean="0"/>
-          </a:p>
-          <a:p>
-            <a:r>
-              <a:rPr lang="en-US" sz="2400" dirty="0" smtClean="0"/>
-              <a:t>Deployment of an application during development</a:t>
-            </a:r>
-          </a:p>
-          <a:p>
-            <a:pPr lvl="1"/>
-            <a:r>
-              <a:rPr lang="en-US" sz="2000" dirty="0" smtClean="0"/>
-              <a:t>Share your environment with a colleague to run on their machine</a:t>
-            </a:r>
-          </a:p>
-          <a:p>
-            <a:pPr lvl="1"/>
-            <a:r>
-              <a:rPr lang="en-US" sz="2000" dirty="0" smtClean="0"/>
-              <a:t>Update a production system with minimum downtime</a:t>
+              <a:t>ttacks (viruses, intrusions) can propagate down to the underlying OS and into other containers</a:t>
             </a:r>
             <a:endParaRPr lang="en-US" sz="2000" dirty="0"/>
+          </a:p>
+          <a:p>
+            <a:pPr>
+              <a:spcBef>
+                <a:spcPts val="4224"/>
+              </a:spcBef>
+            </a:pPr>
+            <a:r>
+              <a:rPr lang="en-US" sz="2400" i="1" dirty="0" smtClean="0">
+                <a:solidFill>
+                  <a:srgbClr val="211F70"/>
+                </a:solidFill>
+              </a:rPr>
+              <a:t>Cannot </a:t>
+            </a:r>
+            <a:r>
+              <a:rPr lang="en-US" sz="2400" i="1" dirty="0">
+                <a:solidFill>
+                  <a:srgbClr val="211F70"/>
+                </a:solidFill>
+              </a:rPr>
+              <a:t>run </a:t>
+            </a:r>
+            <a:r>
+              <a:rPr lang="en-US" sz="2400" i="1" dirty="0" smtClean="0">
+                <a:solidFill>
+                  <a:srgbClr val="211F70"/>
+                </a:solidFill>
+              </a:rPr>
+              <a:t>dockerized apps on </a:t>
+            </a:r>
+            <a:r>
+              <a:rPr lang="en-US" sz="2400" i="1" dirty="0">
+                <a:solidFill>
+                  <a:srgbClr val="211F70"/>
+                </a:solidFill>
+              </a:rPr>
+              <a:t>the CRUK-CI HPC clusters </a:t>
+            </a:r>
+            <a:r>
+              <a:rPr lang="en-US" sz="2400" b="1" i="1" dirty="0">
+                <a:solidFill>
+                  <a:srgbClr val="211F70"/>
+                </a:solidFill>
+                <a:sym typeface="Wingdings"/>
+              </a:rPr>
+              <a:t></a:t>
+            </a:r>
+          </a:p>
+          <a:p>
+            <a:pPr>
+              <a:spcBef>
+                <a:spcPts val="2424"/>
+              </a:spcBef>
+            </a:pPr>
+            <a:endParaRPr lang="en-US" sz="2400" dirty="0">
+              <a:solidFill>
+                <a:srgbClr val="211F70"/>
+              </a:solidFill>
+            </a:endParaRPr>
           </a:p>
         </p:txBody>
       </p:sp>
     </p:spTree>
     <p:extLst>
       <p:ext uri="{BB962C8B-B14F-4D97-AF65-F5344CB8AC3E}">
-        <p14:creationId xmlns:p14="http://schemas.microsoft.com/office/powerpoint/2010/main" val="1058359892"/>
+        <p14:creationId xmlns:p14="http://schemas.microsoft.com/office/powerpoint/2010/main" val="3876767902"/>
       </p:ext>
     </p:extLst>
   </p:cSld>
@@ -5735,7 +7122,79 @@
   <p:timing>
     <p:tnLst>
       <p:par>
-        <p:cTn xmlns:p14="http://schemas.microsoft.com/office/powerpoint/2010/main" id="1" dur="indefinite" restart="never" nodeType="tmRoot"/>
+        <p:cTn xmlns:p14="http://schemas.microsoft.com/office/powerpoint/2010/main" id="1" dur="indefinite" restart="never" nodeType="tmRoot">
+          <p:childTnLst>
+            <p:seq concurrent="1" nextAc="seek">
+              <p:cTn id="2" dur="indefinite" nodeType="mainSeq">
+                <p:childTnLst>
+                  <p:par>
+                    <p:cTn id="3" fill="hold">
+                      <p:stCondLst>
+                        <p:cond delay="indefinite"/>
+                      </p:stCondLst>
+                      <p:childTnLst>
+                        <p:par>
+                          <p:cTn id="4" fill="hold">
+                            <p:stCondLst>
+                              <p:cond delay="0"/>
+                            </p:stCondLst>
+                            <p:childTnLst>
+                              <p:par>
+                                <p:cTn id="5" presetID="1" presetClass="entr" presetSubtype="0" fill="hold" nodeType="clickEffect">
+                                  <p:stCondLst>
+                                    <p:cond delay="0"/>
+                                  </p:stCondLst>
+                                  <p:childTnLst>
+                                    <p:set>
+                                      <p:cBhvr>
+                                        <p:cTn id="6" dur="1" fill="hold">
+                                          <p:stCondLst>
+                                            <p:cond delay="0"/>
+                                          </p:stCondLst>
+                                        </p:cTn>
+                                        <p:tgtEl>
+                                          <p:spTgt spid="3">
+                                            <p:txEl>
+                                              <p:pRg st="5" end="5"/>
+                                            </p:txEl>
+                                          </p:spTgt>
+                                        </p:tgtEl>
+                                        <p:attrNameLst>
+                                          <p:attrName>style.visibility</p:attrName>
+                                        </p:attrNameLst>
+                                      </p:cBhvr>
+                                      <p:to>
+                                        <p:strVal val="visible"/>
+                                      </p:to>
+                                    </p:set>
+                                  </p:childTnLst>
+                                </p:cTn>
+                              </p:par>
+                            </p:childTnLst>
+                          </p:cTn>
+                        </p:par>
+                      </p:childTnLst>
+                    </p:cTn>
+                  </p:par>
+                </p:childTnLst>
+              </p:cTn>
+              <p:prevCondLst>
+                <p:cond evt="onPrev" delay="0">
+                  <p:tgtEl>
+                    <p:sldTgt/>
+                  </p:tgtEl>
+                </p:cond>
+              </p:prevCondLst>
+              <p:nextCondLst>
+                <p:cond evt="onNext" delay="0">
+                  <p:tgtEl>
+                    <p:sldTgt/>
+                  </p:tgtEl>
+                </p:cond>
+              </p:nextCondLst>
+            </p:seq>
+          </p:childTnLst>
+        </p:cTn>
       </p:par>
     </p:tnLst>
   </p:timing>

</xml_diff>

<commit_message>
Swapped order of last two slides, added some more details to docker uses at CRUK-CI
</commit_message>
<xml_diff>
--- a/IntroductionToDocker.pptx
+++ b/IntroductionToDocker.pptx
@@ -17,8 +17,8 @@
     <p:sldId id="296" r:id="rId8"/>
     <p:sldId id="302" r:id="rId9"/>
     <p:sldId id="295" r:id="rId10"/>
-    <p:sldId id="297" r:id="rId11"/>
-    <p:sldId id="301" r:id="rId12"/>
+    <p:sldId id="301" r:id="rId11"/>
+    <p:sldId id="297" r:id="rId12"/>
   </p:sldIdLst>
   <p:sldSz cx="9144000" cy="6858000" type="screen4x3"/>
   <p:notesSz cx="6858000" cy="9144000"/>
@@ -202,7 +202,7 @@
           <a:p>
             <a:fld id="{7A0E3A32-A577-2D42-A514-7706B5551AD8}" type="datetimeFigureOut">
               <a:rPr lang="en-US" smtClean="0"/>
-              <a:t>10/11/16</a:t>
+              <a:t>11/11/16</a:t>
             </a:fld>
             <a:endParaRPr lang="en-US"/>
           </a:p>
@@ -651,7 +651,7 @@
           <a:p>
             <a:fld id="{21C07646-7B62-4D49-8C57-CBA51FBBFCDD}" type="datetimeFigureOut">
               <a:rPr lang="en-US" smtClean="0"/>
-              <a:t>10/11/16</a:t>
+              <a:t>11/11/16</a:t>
             </a:fld>
             <a:endParaRPr lang="en-US"/>
           </a:p>
@@ -821,7 +821,7 @@
           <a:p>
             <a:fld id="{21C07646-7B62-4D49-8C57-CBA51FBBFCDD}" type="datetimeFigureOut">
               <a:rPr lang="en-US" smtClean="0"/>
-              <a:t>10/11/16</a:t>
+              <a:t>11/11/16</a:t>
             </a:fld>
             <a:endParaRPr lang="en-US"/>
           </a:p>
@@ -1001,7 +1001,7 @@
           <a:p>
             <a:fld id="{21C07646-7B62-4D49-8C57-CBA51FBBFCDD}" type="datetimeFigureOut">
               <a:rPr lang="en-US" smtClean="0"/>
-              <a:t>10/11/16</a:t>
+              <a:t>11/11/16</a:t>
             </a:fld>
             <a:endParaRPr lang="en-US"/>
           </a:p>
@@ -1171,7 +1171,7 @@
           <a:p>
             <a:fld id="{21C07646-7B62-4D49-8C57-CBA51FBBFCDD}" type="datetimeFigureOut">
               <a:rPr lang="en-US" smtClean="0"/>
-              <a:t>10/11/16</a:t>
+              <a:t>11/11/16</a:t>
             </a:fld>
             <a:endParaRPr lang="en-US"/>
           </a:p>
@@ -1417,7 +1417,7 @@
           <a:p>
             <a:fld id="{21C07646-7B62-4D49-8C57-CBA51FBBFCDD}" type="datetimeFigureOut">
               <a:rPr lang="en-US" smtClean="0"/>
-              <a:t>10/11/16</a:t>
+              <a:t>11/11/16</a:t>
             </a:fld>
             <a:endParaRPr lang="en-US"/>
           </a:p>
@@ -1705,7 +1705,7 @@
           <a:p>
             <a:fld id="{21C07646-7B62-4D49-8C57-CBA51FBBFCDD}" type="datetimeFigureOut">
               <a:rPr lang="en-US" smtClean="0"/>
-              <a:t>10/11/16</a:t>
+              <a:t>11/11/16</a:t>
             </a:fld>
             <a:endParaRPr lang="en-US"/>
           </a:p>
@@ -2127,7 +2127,7 @@
           <a:p>
             <a:fld id="{21C07646-7B62-4D49-8C57-CBA51FBBFCDD}" type="datetimeFigureOut">
               <a:rPr lang="en-US" smtClean="0"/>
-              <a:t>10/11/16</a:t>
+              <a:t>11/11/16</a:t>
             </a:fld>
             <a:endParaRPr lang="en-US"/>
           </a:p>
@@ -2245,7 +2245,7 @@
           <a:p>
             <a:fld id="{21C07646-7B62-4D49-8C57-CBA51FBBFCDD}" type="datetimeFigureOut">
               <a:rPr lang="en-US" smtClean="0"/>
-              <a:t>10/11/16</a:t>
+              <a:t>11/11/16</a:t>
             </a:fld>
             <a:endParaRPr lang="en-US"/>
           </a:p>
@@ -2340,7 +2340,7 @@
           <a:p>
             <a:fld id="{21C07646-7B62-4D49-8C57-CBA51FBBFCDD}" type="datetimeFigureOut">
               <a:rPr lang="en-US" smtClean="0"/>
-              <a:t>10/11/16</a:t>
+              <a:t>11/11/16</a:t>
             </a:fld>
             <a:endParaRPr lang="en-US"/>
           </a:p>
@@ -2617,7 +2617,7 @@
           <a:p>
             <a:fld id="{21C07646-7B62-4D49-8C57-CBA51FBBFCDD}" type="datetimeFigureOut">
               <a:rPr lang="en-US" smtClean="0"/>
-              <a:t>10/11/16</a:t>
+              <a:t>11/11/16</a:t>
             </a:fld>
             <a:endParaRPr lang="en-US"/>
           </a:p>
@@ -2870,7 +2870,7 @@
           <a:p>
             <a:fld id="{21C07646-7B62-4D49-8C57-CBA51FBBFCDD}" type="datetimeFigureOut">
               <a:rPr lang="en-US" smtClean="0"/>
-              <a:t>10/11/16</a:t>
+              <a:t>11/11/16</a:t>
             </a:fld>
             <a:endParaRPr lang="en-US"/>
           </a:p>
@@ -3083,7 +3083,7 @@
           <a:p>
             <a:fld id="{21C07646-7B62-4D49-8C57-CBA51FBBFCDD}" type="datetimeFigureOut">
               <a:rPr lang="en-US" smtClean="0"/>
-              <a:t>10/11/16</a:t>
+              <a:t>11/11/16</a:t>
             </a:fld>
             <a:endParaRPr lang="en-US"/>
           </a:p>
@@ -3570,7 +3570,7 @@
           <a:p>
             <a:r>
               <a:rPr lang="en-US" dirty="0" smtClean="0"/>
-              <a:t>So how can </a:t>
+              <a:t>How have we used </a:t>
             </a:r>
             <a:r>
               <a:rPr lang="en-US" dirty="0" err="1" smtClean="0"/>
@@ -3578,7 +3578,375 @@
             </a:r>
             <a:r>
               <a:rPr lang="en-US" dirty="0" smtClean="0"/>
-              <a:t> help me?</a:t>
+              <a:t>?</a:t>
+            </a:r>
+            <a:endParaRPr lang="en-US" dirty="0"/>
+          </a:p>
+        </p:txBody>
+      </p:sp>
+      <p:graphicFrame>
+        <p:nvGraphicFramePr>
+          <p:cNvPr id="3" name="Table 2"/>
+          <p:cNvGraphicFramePr>
+            <a:graphicFrameLocks noGrp="1"/>
+          </p:cNvGraphicFramePr>
+          <p:nvPr>
+            <p:extLst>
+              <p:ext uri="{D42A27DB-BD31-4B8C-83A1-F6EECF244321}">
+                <p14:modId xmlns:p14="http://schemas.microsoft.com/office/powerpoint/2010/main" val="3327315304"/>
+              </p:ext>
+            </p:extLst>
+          </p:nvPr>
+        </p:nvGraphicFramePr>
+        <p:xfrm>
+          <a:off x="444497" y="1213072"/>
+          <a:ext cx="8260633" cy="5864181"/>
+        </p:xfrm>
+        <a:graphic>
+          <a:graphicData uri="http://schemas.openxmlformats.org/drawingml/2006/table">
+            <a:tbl>
+              <a:tblPr firstRow="1" bandRow="1">
+                <a:tableStyleId>{2D5ABB26-0587-4C30-8999-92F81FD0307C}</a:tableStyleId>
+              </a:tblPr>
+              <a:tblGrid>
+                <a:gridCol w="3225803"/>
+                <a:gridCol w="5034830"/>
+              </a:tblGrid>
+              <a:tr h="1065986">
+                <a:tc>
+                  <a:txBody>
+                    <a:bodyPr/>
+                    <a:lstStyle/>
+                    <a:p>
+                      <a:r>
+                        <a:rPr lang="en-US" dirty="0" smtClean="0"/>
+                        <a:t>Running</a:t>
+                      </a:r>
+                      <a:r>
+                        <a:rPr lang="en-US" baseline="0" dirty="0" smtClean="0"/>
+                        <a:t> third party software packaged as “dockerized apps”</a:t>
+                      </a:r>
+                      <a:endParaRPr lang="en-US" b="0" dirty="0"/>
+                    </a:p>
+                  </a:txBody>
+                  <a:tcPr marL="182880" marT="91440" marB="91440"/>
+                </a:tc>
+                <a:tc>
+                  <a:txBody>
+                    <a:bodyPr/>
+                    <a:lstStyle/>
+                    <a:p>
+                      <a:r>
+                        <a:rPr lang="en-US" b="1" dirty="0" smtClean="0"/>
+                        <a:t>Sanger Cance</a:t>
+                      </a:r>
+                      <a:r>
+                        <a:rPr lang="en-US" b="1" baseline="0" dirty="0" smtClean="0"/>
+                        <a:t>r Genome Project analysis </a:t>
+                      </a:r>
+                      <a:r>
+                        <a:rPr lang="en-US" b="1" baseline="0" dirty="0" smtClean="0"/>
+                        <a:t>pipeline</a:t>
+                      </a:r>
+                      <a:r>
+                        <a:rPr lang="en-US" b="0" baseline="0" dirty="0" smtClean="0"/>
+                        <a:t> (variant calling for whole genome sequencing)</a:t>
+                      </a:r>
+                      <a:endParaRPr lang="en-US" b="1" baseline="0" dirty="0" smtClean="0"/>
+                    </a:p>
+                    <a:p>
+                      <a:pPr>
+                        <a:spcBef>
+                          <a:spcPts val="600"/>
+                        </a:spcBef>
+                      </a:pPr>
+                      <a:r>
+                        <a:rPr lang="en-US" b="1" baseline="0" dirty="0" err="1" smtClean="0"/>
+                        <a:t>Polysolver</a:t>
+                      </a:r>
+                      <a:r>
+                        <a:rPr lang="en-US" b="0" baseline="0" dirty="0" smtClean="0"/>
+                        <a:t> (HLA typing)</a:t>
+                      </a:r>
+                      <a:endParaRPr lang="en-US" b="1" dirty="0"/>
+                    </a:p>
+                  </a:txBody>
+                  <a:tcPr marL="182880" marT="91440" marB="91440"/>
+                </a:tc>
+              </a:tr>
+              <a:tr h="1065986">
+                <a:tc>
+                  <a:txBody>
+                    <a:bodyPr/>
+                    <a:lstStyle/>
+                    <a:p>
+                      <a:r>
+                        <a:rPr lang="en-US" dirty="0" smtClean="0"/>
+                        <a:t>Installing and running third</a:t>
+                      </a:r>
+                      <a:r>
+                        <a:rPr lang="en-US" baseline="0" dirty="0" smtClean="0"/>
+                        <a:t> party software</a:t>
+                      </a:r>
+                      <a:endParaRPr lang="en-US" b="0" dirty="0"/>
+                    </a:p>
+                  </a:txBody>
+                  <a:tcPr marL="182880" marT="91440" marB="91440"/>
+                </a:tc>
+                <a:tc>
+                  <a:txBody>
+                    <a:bodyPr/>
+                    <a:lstStyle/>
+                    <a:p>
+                      <a:r>
+                        <a:rPr lang="en-US" b="1" dirty="0" err="1" smtClean="0"/>
+                        <a:t>MutSigCV</a:t>
+                      </a:r>
+                      <a:r>
+                        <a:rPr lang="en-US" b="0" baseline="0" dirty="0" smtClean="0"/>
+                        <a:t> (mutational significance)</a:t>
+                      </a:r>
+                      <a:endParaRPr lang="en-US" dirty="0"/>
+                    </a:p>
+                  </a:txBody>
+                  <a:tcPr marL="182880" marT="91440" marB="91440"/>
+                </a:tc>
+              </a:tr>
+              <a:tr h="1201729">
+                <a:tc>
+                  <a:txBody>
+                    <a:bodyPr/>
+                    <a:lstStyle/>
+                    <a:p>
+                      <a:r>
+                        <a:rPr lang="en-US" dirty="0" smtClean="0"/>
+                        <a:t>Deploying Shiny applications</a:t>
+                      </a:r>
+                      <a:endParaRPr lang="en-US" dirty="0"/>
+                    </a:p>
+                  </a:txBody>
+                  <a:tcPr marL="182880" marT="91440" marB="91440"/>
+                </a:tc>
+                <a:tc>
+                  <a:txBody>
+                    <a:bodyPr/>
+                    <a:lstStyle/>
+                    <a:p>
+                      <a:r>
+                        <a:rPr lang="en-US" b="1" dirty="0" smtClean="0"/>
+                        <a:t>Proteomics</a:t>
+                      </a:r>
+                      <a:r>
+                        <a:rPr lang="en-US" b="1" baseline="0" dirty="0" smtClean="0"/>
+                        <a:t> TMT analysis </a:t>
+                      </a:r>
+                      <a:r>
+                        <a:rPr lang="en-US" baseline="0" dirty="0" smtClean="0"/>
+                        <a:t>(Bioinformatics Core)</a:t>
+                      </a:r>
+                    </a:p>
+                    <a:p>
+                      <a:pPr>
+                        <a:spcBef>
+                          <a:spcPts val="600"/>
+                        </a:spcBef>
+                      </a:pPr>
+                      <a:r>
+                        <a:rPr lang="en-US" b="1" baseline="0" dirty="0" smtClean="0"/>
+                        <a:t>Breast Cancer PDTX Encyclopaedia </a:t>
+                      </a:r>
+                      <a:r>
+                        <a:rPr lang="en-US" baseline="0" dirty="0" smtClean="0"/>
+                        <a:t>(Caldas lab, Bioinformatics Core)</a:t>
+                      </a:r>
+                      <a:endParaRPr lang="en-US" dirty="0"/>
+                    </a:p>
+                  </a:txBody>
+                  <a:tcPr marL="182880" marT="91440" marB="91440"/>
+                </a:tc>
+              </a:tr>
+              <a:tr h="1448441">
+                <a:tc>
+                  <a:txBody>
+                    <a:bodyPr/>
+                    <a:lstStyle/>
+                    <a:p>
+                      <a:r>
+                        <a:rPr lang="en-US" dirty="0" smtClean="0"/>
+                        <a:t>Packaging and distributing</a:t>
+                      </a:r>
+                      <a:r>
+                        <a:rPr lang="en-US" baseline="0" dirty="0" smtClean="0"/>
+                        <a:t> tools developed in-house</a:t>
+                      </a:r>
+                      <a:endParaRPr lang="en-US" dirty="0"/>
+                    </a:p>
+                  </a:txBody>
+                  <a:tcPr marL="182880" marT="91440" marB="91440"/>
+                </a:tc>
+                <a:tc>
+                  <a:txBody>
+                    <a:bodyPr/>
+                    <a:lstStyle/>
+                    <a:p>
+                      <a:r>
+                        <a:rPr lang="en-US" dirty="0" err="1" smtClean="0"/>
+                        <a:t>Tumour</a:t>
+                      </a:r>
+                      <a:r>
+                        <a:rPr lang="en-US" baseline="0" dirty="0" smtClean="0"/>
+                        <a:t> </a:t>
+                      </a:r>
+                      <a:r>
+                        <a:rPr lang="en-US" baseline="0" dirty="0" err="1" smtClean="0"/>
+                        <a:t>clonality</a:t>
+                      </a:r>
+                      <a:r>
+                        <a:rPr lang="en-US" baseline="0" dirty="0" smtClean="0"/>
+                        <a:t> analysis for ICGC-TCGA-DREAM Challenge (Geoff </a:t>
+                      </a:r>
+                      <a:r>
+                        <a:rPr lang="en-US" baseline="0" dirty="0" err="1" smtClean="0"/>
+                        <a:t>MacIntyre</a:t>
+                      </a:r>
+                      <a:r>
+                        <a:rPr lang="en-US" baseline="0" dirty="0" smtClean="0"/>
+                        <a:t>)</a:t>
+                      </a:r>
+                    </a:p>
+                    <a:p>
+                      <a:pPr>
+                        <a:spcBef>
+                          <a:spcPts val="600"/>
+                        </a:spcBef>
+                      </a:pPr>
+                      <a:r>
+                        <a:rPr lang="en-US" b="1" baseline="0" dirty="0" err="1" smtClean="0"/>
+                        <a:t>ParaBam</a:t>
+                      </a:r>
+                      <a:r>
+                        <a:rPr lang="en-US" baseline="0" dirty="0" smtClean="0"/>
+                        <a:t> tool for optimized processing of BAM files (Henry </a:t>
+                      </a:r>
+                      <a:r>
+                        <a:rPr lang="en-US" baseline="0" dirty="0" err="1" smtClean="0"/>
+                        <a:t>Farmery</a:t>
+                      </a:r>
+                      <a:r>
+                        <a:rPr lang="en-US" baseline="0" dirty="0" smtClean="0"/>
+                        <a:t>)</a:t>
+                      </a:r>
+                      <a:endParaRPr lang="en-US" dirty="0"/>
+                    </a:p>
+                  </a:txBody>
+                  <a:tcPr marL="182880" marT="91440" marB="91440"/>
+                </a:tc>
+              </a:tr>
+              <a:tr h="1065986">
+                <a:tc>
+                  <a:txBody>
+                    <a:bodyPr/>
+                    <a:lstStyle/>
+                    <a:p>
+                      <a:r>
+                        <a:rPr lang="en-US" dirty="0" smtClean="0"/>
+                        <a:t>Training</a:t>
+                      </a:r>
+                      <a:endParaRPr lang="en-US" dirty="0"/>
+                    </a:p>
+                  </a:txBody>
+                  <a:tcPr marL="182880" marT="91440" marB="91440"/>
+                </a:tc>
+                <a:tc>
+                  <a:txBody>
+                    <a:bodyPr/>
+                    <a:lstStyle/>
+                    <a:p>
+                      <a:r>
+                        <a:rPr lang="en-US" dirty="0" smtClean="0"/>
+                        <a:t>CRUK</a:t>
+                      </a:r>
+                      <a:r>
+                        <a:rPr lang="en-US" baseline="0" dirty="0" smtClean="0"/>
+                        <a:t> Summer School on cancer genome analysis</a:t>
+                      </a:r>
+                      <a:endParaRPr lang="en-US" dirty="0"/>
+                    </a:p>
+                  </a:txBody>
+                  <a:tcPr marL="182880" marT="91440" marB="91440"/>
+                </a:tc>
+              </a:tr>
+            </a:tbl>
+          </a:graphicData>
+        </a:graphic>
+      </p:graphicFrame>
+    </p:spTree>
+    <p:extLst>
+      <p:ext uri="{BB962C8B-B14F-4D97-AF65-F5344CB8AC3E}">
+        <p14:creationId xmlns:p14="http://schemas.microsoft.com/office/powerpoint/2010/main" val="734422584"/>
+      </p:ext>
+    </p:extLst>
+  </p:cSld>
+  <p:clrMapOvr>
+    <a:masterClrMapping/>
+  </p:clrMapOvr>
+  <p:timing>
+    <p:tnLst>
+      <p:par>
+        <p:cTn xmlns:p14="http://schemas.microsoft.com/office/powerpoint/2010/main" id="1" dur="indefinite" restart="never" nodeType="tmRoot"/>
+      </p:par>
+    </p:tnLst>
+  </p:timing>
+</p:sld>
+</file>
+
+<file path=ppt/slides/slide11.xml><?xml version="1.0" encoding="utf-8"?>
+<p:sld xmlns:a="http://schemas.openxmlformats.org/drawingml/2006/main" xmlns:r="http://schemas.openxmlformats.org/officeDocument/2006/relationships" xmlns:p="http://schemas.openxmlformats.org/presentationml/2006/main">
+  <p:cSld>
+    <p:spTree>
+      <p:nvGrpSpPr>
+        <p:cNvPr id="1" name=""/>
+        <p:cNvGrpSpPr/>
+        <p:nvPr/>
+      </p:nvGrpSpPr>
+      <p:grpSpPr>
+        <a:xfrm>
+          <a:off x="0" y="0"/>
+          <a:ext cx="0" cy="0"/>
+          <a:chOff x="0" y="0"/>
+          <a:chExt cx="0" cy="0"/>
+        </a:xfrm>
+      </p:grpSpPr>
+      <p:sp>
+        <p:nvSpPr>
+          <p:cNvPr id="2" name="Title 1"/>
+          <p:cNvSpPr>
+            <a:spLocks noGrp="1"/>
+          </p:cNvSpPr>
+          <p:nvPr>
+            <p:ph type="title"/>
+          </p:nvPr>
+        </p:nvSpPr>
+        <p:spPr/>
+        <p:txBody>
+          <a:bodyPr/>
+          <a:lstStyle/>
+          <a:p>
+            <a:r>
+              <a:rPr lang="en-US" dirty="0" smtClean="0"/>
+              <a:t>So how can </a:t>
+            </a:r>
+            <a:r>
+              <a:rPr lang="en-US" dirty="0" err="1" smtClean="0"/>
+              <a:t>Docker</a:t>
+            </a:r>
+            <a:r>
+              <a:rPr lang="en-US" dirty="0" smtClean="0"/>
+              <a:t> help </a:t>
+            </a:r>
+            <a:r>
+              <a:rPr lang="en-US" dirty="0" smtClean="0"/>
+              <a:t>me?</a:t>
             </a:r>
             <a:endParaRPr lang="en-US" dirty="0"/>
           </a:p>
@@ -3603,11 +3971,7 @@
           <a:p>
             <a:r>
               <a:rPr lang="en-US" sz="2400" dirty="0" smtClean="0"/>
-              <a:t>Trialing </a:t>
-            </a:r>
-            <a:r>
-              <a:rPr lang="en-US" sz="2400" dirty="0" smtClean="0"/>
-              <a:t>new software</a:t>
+              <a:t>Trialing new software</a:t>
             </a:r>
           </a:p>
           <a:p>
@@ -3621,15 +3985,7 @@
             <a:pPr lvl="1"/>
             <a:r>
               <a:rPr lang="en-US" sz="2000" dirty="0" smtClean="0"/>
-              <a:t>Isolated </a:t>
-            </a:r>
-            <a:r>
-              <a:rPr lang="en-US" sz="2000" dirty="0" smtClean="0"/>
-              <a:t>environment, won’t </a:t>
-            </a:r>
-            <a:r>
-              <a:rPr lang="en-US" sz="2000" dirty="0" smtClean="0"/>
-              <a:t>affect other applications</a:t>
+              <a:t>Isolated environment, won’t affect other applications</a:t>
             </a:r>
           </a:p>
           <a:p>
@@ -4034,353 +4390,6 @@
 </p:sld>
 </file>
 
-<file path=ppt/slides/slide11.xml><?xml version="1.0" encoding="utf-8"?>
-<p:sld xmlns:a="http://schemas.openxmlformats.org/drawingml/2006/main" xmlns:r="http://schemas.openxmlformats.org/officeDocument/2006/relationships" xmlns:p="http://schemas.openxmlformats.org/presentationml/2006/main">
-  <p:cSld>
-    <p:spTree>
-      <p:nvGrpSpPr>
-        <p:cNvPr id="1" name=""/>
-        <p:cNvGrpSpPr/>
-        <p:nvPr/>
-      </p:nvGrpSpPr>
-      <p:grpSpPr>
-        <a:xfrm>
-          <a:off x="0" y="0"/>
-          <a:ext cx="0" cy="0"/>
-          <a:chOff x="0" y="0"/>
-          <a:chExt cx="0" cy="0"/>
-        </a:xfrm>
-      </p:grpSpPr>
-      <p:sp>
-        <p:nvSpPr>
-          <p:cNvPr id="2" name="Title 1"/>
-          <p:cNvSpPr>
-            <a:spLocks noGrp="1"/>
-          </p:cNvSpPr>
-          <p:nvPr>
-            <p:ph type="title"/>
-          </p:nvPr>
-        </p:nvSpPr>
-        <p:spPr/>
-        <p:txBody>
-          <a:bodyPr/>
-          <a:lstStyle/>
-          <a:p>
-            <a:r>
-              <a:rPr lang="en-US" dirty="0" smtClean="0"/>
-              <a:t>How have we used </a:t>
-            </a:r>
-            <a:r>
-              <a:rPr lang="en-US" dirty="0" err="1" smtClean="0"/>
-              <a:t>Docker</a:t>
-            </a:r>
-            <a:r>
-              <a:rPr lang="en-US" dirty="0" smtClean="0"/>
-              <a:t>?</a:t>
-            </a:r>
-            <a:endParaRPr lang="en-US" dirty="0"/>
-          </a:p>
-        </p:txBody>
-      </p:sp>
-      <p:graphicFrame>
-        <p:nvGraphicFramePr>
-          <p:cNvPr id="3" name="Table 2"/>
-          <p:cNvGraphicFramePr>
-            <a:graphicFrameLocks noGrp="1"/>
-          </p:cNvGraphicFramePr>
-          <p:nvPr>
-            <p:extLst>
-              <p:ext uri="{D42A27DB-BD31-4B8C-83A1-F6EECF244321}">
-                <p14:modId xmlns:p14="http://schemas.microsoft.com/office/powerpoint/2010/main" val="1031239081"/>
-              </p:ext>
-            </p:extLst>
-          </p:nvPr>
-        </p:nvGraphicFramePr>
-        <p:xfrm>
-          <a:off x="444497" y="1213072"/>
-          <a:ext cx="8260633" cy="5848128"/>
-        </p:xfrm>
-        <a:graphic>
-          <a:graphicData uri="http://schemas.openxmlformats.org/drawingml/2006/table">
-            <a:tbl>
-              <a:tblPr firstRow="1" bandRow="1">
-                <a:tableStyleId>{2D5ABB26-0587-4C30-8999-92F81FD0307C}</a:tableStyleId>
-              </a:tblPr>
-              <a:tblGrid>
-                <a:gridCol w="3225803"/>
-                <a:gridCol w="5034830"/>
-              </a:tblGrid>
-              <a:tr h="1065986">
-                <a:tc>
-                  <a:txBody>
-                    <a:bodyPr/>
-                    <a:lstStyle/>
-                    <a:p>
-                      <a:r>
-                        <a:rPr lang="en-US" dirty="0" smtClean="0"/>
-                        <a:t>Running</a:t>
-                      </a:r>
-                      <a:r>
-                        <a:rPr lang="en-US" baseline="0" dirty="0" smtClean="0"/>
-                        <a:t> third party software packaged as “dockerized apps”</a:t>
-                      </a:r>
-                      <a:endParaRPr lang="en-US" b="0" dirty="0"/>
-                    </a:p>
-                  </a:txBody>
-                  <a:tcPr marL="182880" marT="91440" marB="91440"/>
-                </a:tc>
-                <a:tc>
-                  <a:txBody>
-                    <a:bodyPr/>
-                    <a:lstStyle/>
-                    <a:p>
-                      <a:r>
-                        <a:rPr lang="en-US" b="1" dirty="0" smtClean="0"/>
-                        <a:t>Sanger Cance</a:t>
-                      </a:r>
-                      <a:r>
-                        <a:rPr lang="en-US" b="1" baseline="0" dirty="0" smtClean="0"/>
-                        <a:t>r Genome Project analysis pipeline</a:t>
-                      </a:r>
-                    </a:p>
-                    <a:p>
-                      <a:pPr>
-                        <a:spcBef>
-                          <a:spcPts val="1200"/>
-                        </a:spcBef>
-                      </a:pPr>
-                      <a:r>
-                        <a:rPr lang="en-US" b="1" baseline="0" dirty="0" smtClean="0"/>
-                        <a:t>Polysolver</a:t>
-                      </a:r>
-                      <a:endParaRPr lang="en-US" b="1" dirty="0"/>
-                    </a:p>
-                  </a:txBody>
-                  <a:tcPr marL="182880" marT="91440" marB="91440"/>
-                </a:tc>
-              </a:tr>
-              <a:tr h="1065986">
-                <a:tc>
-                  <a:txBody>
-                    <a:bodyPr/>
-                    <a:lstStyle/>
-                    <a:p>
-                      <a:r>
-                        <a:rPr lang="en-US" dirty="0" smtClean="0"/>
-                        <a:t>Installing and running third</a:t>
-                      </a:r>
-                      <a:r>
-                        <a:rPr lang="en-US" baseline="0" dirty="0" smtClean="0"/>
-                        <a:t> party software</a:t>
-                      </a:r>
-                      <a:endParaRPr lang="en-US" b="0" dirty="0"/>
-                    </a:p>
-                  </a:txBody>
-                  <a:tcPr marL="182880" marT="91440" marB="91440"/>
-                </a:tc>
-                <a:tc>
-                  <a:txBody>
-                    <a:bodyPr/>
-                    <a:lstStyle/>
-                    <a:p>
-                      <a:r>
-                        <a:rPr lang="en-US" b="1" dirty="0" smtClean="0"/>
-                        <a:t>MutSigCV</a:t>
-                      </a:r>
-                      <a:endParaRPr lang="en-US" dirty="0"/>
-                    </a:p>
-                  </a:txBody>
-                  <a:tcPr marL="182880" marT="91440" marB="91440"/>
-                </a:tc>
-              </a:tr>
-              <a:tr h="1201729">
-                <a:tc>
-                  <a:txBody>
-                    <a:bodyPr/>
-                    <a:lstStyle/>
-                    <a:p>
-                      <a:r>
-                        <a:rPr lang="en-US" dirty="0" smtClean="0"/>
-                        <a:t>Deploying Shiny applications</a:t>
-                      </a:r>
-                      <a:endParaRPr lang="en-US" dirty="0"/>
-                    </a:p>
-                  </a:txBody>
-                  <a:tcPr marL="182880" marT="91440" marB="91440"/>
-                </a:tc>
-                <a:tc>
-                  <a:txBody>
-                    <a:bodyPr/>
-                    <a:lstStyle/>
-                    <a:p>
-                      <a:r>
-                        <a:rPr lang="en-US" b="1" dirty="0" smtClean="0"/>
-                        <a:t>Proteomics</a:t>
-                      </a:r>
-                      <a:r>
-                        <a:rPr lang="en-US" b="1" baseline="0" dirty="0" smtClean="0"/>
-                        <a:t> TMT analysis </a:t>
-                      </a:r>
-                      <a:r>
-                        <a:rPr lang="en-US" baseline="0" dirty="0" smtClean="0"/>
-                        <a:t>(Bioinformatics Core)</a:t>
-                      </a:r>
-                    </a:p>
-                    <a:p>
-                      <a:pPr>
-                        <a:spcBef>
-                          <a:spcPts val="600"/>
-                        </a:spcBef>
-                      </a:pPr>
-                      <a:r>
-                        <a:rPr lang="en-US" b="1" baseline="0" dirty="0" smtClean="0"/>
-                        <a:t>Breast Cancer PDTX Encyclopaedia </a:t>
-                      </a:r>
-                      <a:r>
-                        <a:rPr lang="en-US" baseline="0" dirty="0" smtClean="0"/>
-                        <a:t>(Caldas lab, Bioinformatics Core)</a:t>
-                      </a:r>
-                      <a:endParaRPr lang="en-US" dirty="0"/>
-                    </a:p>
-                  </a:txBody>
-                  <a:tcPr marL="182880" marT="91440" marB="91440"/>
-                </a:tc>
-              </a:tr>
-              <a:tr h="1448441">
-                <a:tc>
-                  <a:txBody>
-                    <a:bodyPr/>
-                    <a:lstStyle/>
-                    <a:p>
-                      <a:r>
-                        <a:rPr lang="en-US" dirty="0" smtClean="0"/>
-                        <a:t>Packaging and distributing</a:t>
-                      </a:r>
-                      <a:r>
-                        <a:rPr lang="en-US" baseline="0" dirty="0" smtClean="0"/>
-                        <a:t> tools developed in-house</a:t>
-                      </a:r>
-                      <a:endParaRPr lang="en-US" dirty="0"/>
-                    </a:p>
-                  </a:txBody>
-                  <a:tcPr marL="182880" marT="91440" marB="91440"/>
-                </a:tc>
-                <a:tc>
-                  <a:txBody>
-                    <a:bodyPr/>
-                    <a:lstStyle/>
-                    <a:p>
-                      <a:r>
-                        <a:rPr lang="en-US" dirty="0" err="1" smtClean="0"/>
-                        <a:t>Tumour</a:t>
-                      </a:r>
-                      <a:r>
-                        <a:rPr lang="en-US" baseline="0" dirty="0" smtClean="0"/>
-                        <a:t> </a:t>
-                      </a:r>
-                      <a:r>
-                        <a:rPr lang="en-US" baseline="0" dirty="0" err="1" smtClean="0"/>
-                        <a:t>clonality</a:t>
-                      </a:r>
-                      <a:r>
-                        <a:rPr lang="en-US" baseline="0" dirty="0" smtClean="0"/>
-                        <a:t> analysis for ICGC-TCGA-DREAM Challenge (Geoff </a:t>
-                      </a:r>
-                      <a:r>
-                        <a:rPr lang="en-US" baseline="0" dirty="0" err="1" smtClean="0"/>
-                        <a:t>MacIntyre</a:t>
-                      </a:r>
-                      <a:r>
-                        <a:rPr lang="en-US" baseline="0" dirty="0" smtClean="0"/>
-                        <a:t>)</a:t>
-                      </a:r>
-                    </a:p>
-                    <a:p>
-                      <a:pPr>
-                        <a:spcBef>
-                          <a:spcPts val="600"/>
-                        </a:spcBef>
-                      </a:pPr>
-                      <a:r>
-                        <a:rPr lang="en-US" b="1" baseline="0" dirty="0" err="1" smtClean="0"/>
-                        <a:t>ParaBam</a:t>
-                      </a:r>
-                      <a:r>
-                        <a:rPr lang="en-US" baseline="0" dirty="0" smtClean="0"/>
-                        <a:t> tool for optimized processing of BAM files (Henry </a:t>
-                      </a:r>
-                      <a:r>
-                        <a:rPr lang="en-US" baseline="0" dirty="0" err="1" smtClean="0"/>
-                        <a:t>Farmery</a:t>
-                      </a:r>
-                      <a:r>
-                        <a:rPr lang="en-US" baseline="0" dirty="0" smtClean="0"/>
-                        <a:t>)</a:t>
-                      </a:r>
-                      <a:endParaRPr lang="en-US" dirty="0"/>
-                    </a:p>
-                  </a:txBody>
-                  <a:tcPr marL="182880" marT="91440" marB="91440"/>
-                </a:tc>
-              </a:tr>
-              <a:tr h="1065986">
-                <a:tc>
-                  <a:txBody>
-                    <a:bodyPr/>
-                    <a:lstStyle/>
-                    <a:p>
-                      <a:r>
-                        <a:rPr lang="en-US" dirty="0" smtClean="0"/>
-                        <a:t>Training</a:t>
-                      </a:r>
-                      <a:endParaRPr lang="en-US" dirty="0"/>
-                    </a:p>
-                  </a:txBody>
-                  <a:tcPr marL="182880" marT="91440" marB="91440"/>
-                </a:tc>
-                <a:tc>
-                  <a:txBody>
-                    <a:bodyPr/>
-                    <a:lstStyle/>
-                    <a:p>
-                      <a:r>
-                        <a:rPr lang="en-US" dirty="0" smtClean="0"/>
-                        <a:t>CRUK</a:t>
-                      </a:r>
-                      <a:r>
-                        <a:rPr lang="en-US" baseline="0" dirty="0" smtClean="0"/>
-                        <a:t> Summer School on cancer genome analysis</a:t>
-                      </a:r>
-                      <a:endParaRPr lang="en-US" dirty="0"/>
-                    </a:p>
-                  </a:txBody>
-                  <a:tcPr marL="182880" marT="91440" marB="91440"/>
-                </a:tc>
-              </a:tr>
-            </a:tbl>
-          </a:graphicData>
-        </a:graphic>
-      </p:graphicFrame>
-    </p:spTree>
-    <p:extLst>
-      <p:ext uri="{BB962C8B-B14F-4D97-AF65-F5344CB8AC3E}">
-        <p14:creationId xmlns:p14="http://schemas.microsoft.com/office/powerpoint/2010/main" val="734422584"/>
-      </p:ext>
-    </p:extLst>
-  </p:cSld>
-  <p:clrMapOvr>
-    <a:masterClrMapping/>
-  </p:clrMapOvr>
-  <p:timing>
-    <p:tnLst>
-      <p:par>
-        <p:cTn xmlns:p14="http://schemas.microsoft.com/office/powerpoint/2010/main" id="1" dur="indefinite" restart="never" nodeType="tmRoot"/>
-      </p:par>
-    </p:tnLst>
-  </p:timing>
-</p:sld>
-</file>
-
 <file path=ppt/slides/slide2.xml><?xml version="1.0" encoding="utf-8"?>
 <p:sld xmlns:a="http://schemas.openxmlformats.org/drawingml/2006/main" xmlns:r="http://schemas.openxmlformats.org/officeDocument/2006/relationships" xmlns:p="http://schemas.openxmlformats.org/presentationml/2006/main">
   <p:cSld>
@@ -5478,11 +5487,7 @@
             </a:r>
             <a:r>
               <a:rPr lang="en-US" dirty="0" smtClean="0"/>
-              <a:t>in </a:t>
-            </a:r>
-            <a:r>
-              <a:rPr lang="en-US" dirty="0" smtClean="0"/>
-              <a:t>practice</a:t>
+              <a:t>in practice</a:t>
             </a:r>
             <a:endParaRPr lang="en-US" dirty="0"/>
           </a:p>
@@ -5508,11 +5513,7 @@
             </a:pPr>
             <a:r>
               <a:rPr lang="en-US" sz="2400" dirty="0" smtClean="0"/>
-              <a:t>Pull an image from a </a:t>
-            </a:r>
-            <a:r>
-              <a:rPr lang="en-US" sz="2400" dirty="0" smtClean="0"/>
-              <a:t>repository</a:t>
+              <a:t>Pull an image from a repository</a:t>
             </a:r>
             <a:endParaRPr lang="en-US" sz="2000" dirty="0"/>
           </a:p>
@@ -5541,14 +5542,7 @@
                 <a:latin typeface="Courier"/>
                 <a:cs typeface="Courier"/>
               </a:rPr>
-              <a:t> </a:t>
-            </a:r>
-            <a:r>
-              <a:rPr lang="en-US" sz="2000" b="1" dirty="0" smtClean="0">
-                <a:latin typeface="Courier"/>
-                <a:cs typeface="Courier"/>
-              </a:rPr>
-              <a:t>pull </a:t>
+              <a:t> pull </a:t>
             </a:r>
             <a:r>
               <a:rPr lang="en-US" sz="2000" b="1" dirty="0" err="1" smtClean="0">
@@ -5594,15 +5588,7 @@
             </a:pPr>
             <a:r>
               <a:rPr lang="en-US" sz="2400" dirty="0" smtClean="0"/>
-              <a:t>Run </a:t>
-            </a:r>
-            <a:r>
-              <a:rPr lang="en-US" sz="2400" dirty="0" smtClean="0"/>
-              <a:t>a command within a new container based on this </a:t>
-            </a:r>
-            <a:r>
-              <a:rPr lang="en-US" sz="2400" dirty="0" smtClean="0"/>
-              <a:t>image</a:t>
+              <a:t>Run a command within a new container based on this image</a:t>
             </a:r>
             <a:endParaRPr lang="en-US" sz="1800" b="1" dirty="0" smtClean="0">
               <a:latin typeface="Courier"/>
@@ -5634,21 +5620,7 @@
                 <a:latin typeface="Courier"/>
                 <a:cs typeface="Courier"/>
               </a:rPr>
-              <a:t> </a:t>
-            </a:r>
-            <a:r>
-              <a:rPr lang="en-US" sz="2000" b="1" dirty="0" smtClean="0">
-                <a:latin typeface="Courier"/>
-                <a:cs typeface="Courier"/>
-              </a:rPr>
-              <a:t>run </a:t>
-            </a:r>
-            <a:r>
-              <a:rPr lang="en-US" sz="2000" b="1" dirty="0" smtClean="0">
-                <a:latin typeface="Courier"/>
-                <a:cs typeface="Courier"/>
-              </a:rPr>
-              <a:t>-it </a:t>
+              <a:t> run -it </a:t>
             </a:r>
             <a:r>
               <a:rPr lang="en-US" sz="2000" b="1" dirty="0" err="1" smtClean="0">
@@ -5788,11 +5760,7 @@
             </a:r>
             <a:r>
               <a:rPr lang="en-US" sz="2000" dirty="0" smtClean="0"/>
-              <a:t> </a:t>
-            </a:r>
-            <a:r>
-              <a:rPr lang="en-US" sz="2000" dirty="0" smtClean="0"/>
-              <a:t>Start from an existing image, e.g. the base </a:t>
+              <a:t> Start from an existing image, e.g. the base </a:t>
             </a:r>
             <a:r>
               <a:rPr lang="en-US" sz="2000" dirty="0" err="1" smtClean="0"/>
@@ -5825,10 +5793,6 @@
               </a:rPr>
               <a:t> run -it centos bash</a:t>
             </a:r>
-            <a:endParaRPr lang="en-US" sz="2000" b="1" dirty="0" smtClean="0">
-              <a:latin typeface="Courier"/>
-              <a:cs typeface="Courier"/>
-            </a:endParaRPr>
           </a:p>
           <a:p>
             <a:pPr marL="0" indent="0">
@@ -5854,7 +5818,6 @@
               <a:rPr lang="en-US" sz="2000" dirty="0" smtClean="0"/>
               <a:t>  Install new software, add data files, etc.</a:t>
             </a:r>
-            <a:endParaRPr lang="en-US" sz="2000" dirty="0" smtClean="0"/>
           </a:p>
           <a:p>
             <a:pPr marL="0" indent="0">
@@ -5982,14 +5945,7 @@
                 <a:latin typeface="Courier"/>
                 <a:cs typeface="Courier"/>
               </a:rPr>
-              <a:t>d</a:t>
-            </a:r>
-            <a:r>
-              <a:rPr lang="en-US" sz="2000" b="1" dirty="0" err="1" smtClean="0">
-                <a:latin typeface="Courier"/>
-                <a:cs typeface="Courier"/>
-              </a:rPr>
-              <a:t>ocker</a:t>
+              <a:t>docker</a:t>
             </a:r>
             <a:r>
               <a:rPr lang="en-US" sz="2000" b="1" dirty="0" smtClean="0">
@@ -6045,11 +6001,7 @@
             </a:r>
             <a:r>
               <a:rPr lang="en-US" sz="2400" b="1" dirty="0" err="1" smtClean="0"/>
-              <a:t>Docker</a:t>
-            </a:r>
-            <a:r>
-              <a:rPr lang="en-US" sz="2400" b="1" dirty="0" err="1" smtClean="0"/>
-              <a:t>file</a:t>
+              <a:t>Dockerfile</a:t>
             </a:r>
             <a:endParaRPr lang="en-US" sz="2400" b="1" dirty="0"/>
           </a:p>
@@ -6814,11 +6766,7 @@
             </a:r>
             <a:r>
               <a:rPr lang="en-US" sz="1600" i="1" dirty="0" smtClean="0"/>
-              <a:t> (VMware</a:t>
-            </a:r>
-            <a:r>
-              <a:rPr lang="en-US" sz="1600" i="1" dirty="0" smtClean="0"/>
-              <a:t>, </a:t>
+              <a:t> (VMware, </a:t>
             </a:r>
             <a:r>
               <a:rPr lang="en-US" sz="1600" i="1" dirty="0" err="1" smtClean="0"/>
@@ -6828,7 +6776,6 @@
               <a:rPr lang="en-US" sz="1600" i="1" dirty="0" smtClean="0"/>
               <a:t>)</a:t>
             </a:r>
-            <a:endParaRPr lang="en-US" sz="1600" i="1" dirty="0" smtClean="0"/>
           </a:p>
           <a:p>
             <a:pPr>
@@ -6880,19 +6827,7 @@
             </a:pPr>
             <a:r>
               <a:rPr lang="en-US" sz="1600" dirty="0" smtClean="0"/>
-              <a:t>Containers </a:t>
-            </a:r>
-            <a:r>
-              <a:rPr lang="en-US" sz="1600" dirty="0" smtClean="0"/>
-              <a:t>run as isolated processes on the host </a:t>
-            </a:r>
-            <a:r>
-              <a:rPr lang="en-US" sz="1600" dirty="0" smtClean="0"/>
-              <a:t>OS – lightweight, start </a:t>
-            </a:r>
-            <a:r>
-              <a:rPr lang="en-US" sz="1600" dirty="0" smtClean="0"/>
-              <a:t>instantly, use less memory</a:t>
+              <a:t>Containers run as isolated processes on the host OS – lightweight, start instantly, use less memory</a:t>
             </a:r>
           </a:p>
         </p:txBody>

</xml_diff>